<commit_message>
refactor : 정확도 상승
Mnist 정확도 올라가는 과정을 나타내는 그래프 ( tensorboard 이용 )
Tensorboard log file작성
</commit_message>
<xml_diff>
--- a/ppt/인공지능 MNIST 발표(정건우).pptx
+++ b/ppt/인공지능 MNIST 발표(정건우).pptx
@@ -13,10 +13,10 @@
     <p:sldId id="302" r:id="rId4"/>
     <p:sldId id="289" r:id="rId5"/>
     <p:sldId id="290" r:id="rId6"/>
-    <p:sldId id="291" r:id="rId7"/>
-    <p:sldId id="297" r:id="rId8"/>
-    <p:sldId id="298" r:id="rId9"/>
-    <p:sldId id="301" r:id="rId10"/>
+    <p:sldId id="303" r:id="rId7"/>
+    <p:sldId id="304" r:id="rId8"/>
+    <p:sldId id="305" r:id="rId9"/>
+    <p:sldId id="306" r:id="rId10"/>
     <p:sldId id="300" r:id="rId11"/>
     <p:sldId id="273" r:id="rId12"/>
     <p:sldId id="296" r:id="rId13"/>
@@ -212,7 +212,7 @@
           <a:p>
             <a:fld id="{4C93EB0C-C87C-475F-B8F8-469DF3A467E8}" type="datetimeFigureOut">
               <a:rPr lang="zh-CN" altLang="en-US" smtClean="0"/>
-              <a:t>2018/12/18</a:t>
+              <a:t>2018/12/20</a:t>
             </a:fld>
             <a:endParaRPr lang="zh-CN" altLang="en-US"/>
           </a:p>
@@ -968,7 +968,7 @@
     </p:spTree>
     <p:extLst>
       <p:ext uri="{BB962C8B-B14F-4D97-AF65-F5344CB8AC3E}">
-        <p14:creationId xmlns:p14="http://schemas.microsoft.com/office/powerpoint/2010/main" val="4054171073"/>
+        <p14:creationId xmlns:p14="http://schemas.microsoft.com/office/powerpoint/2010/main" val="3861362874"/>
       </p:ext>
     </p:extLst>
   </p:cSld>
@@ -1057,7 +1057,7 @@
     </p:spTree>
     <p:extLst>
       <p:ext uri="{BB962C8B-B14F-4D97-AF65-F5344CB8AC3E}">
-        <p14:creationId xmlns:p14="http://schemas.microsoft.com/office/powerpoint/2010/main" val="1934242461"/>
+        <p14:creationId xmlns:p14="http://schemas.microsoft.com/office/powerpoint/2010/main" val="3358495907"/>
       </p:ext>
     </p:extLst>
   </p:cSld>
@@ -1146,7 +1146,7 @@
     </p:spTree>
     <p:extLst>
       <p:ext uri="{BB962C8B-B14F-4D97-AF65-F5344CB8AC3E}">
-        <p14:creationId xmlns:p14="http://schemas.microsoft.com/office/powerpoint/2010/main" val="660722630"/>
+        <p14:creationId xmlns:p14="http://schemas.microsoft.com/office/powerpoint/2010/main" val="1844099176"/>
       </p:ext>
     </p:extLst>
   </p:cSld>
@@ -1235,7 +1235,7 @@
     </p:spTree>
     <p:extLst>
       <p:ext uri="{BB962C8B-B14F-4D97-AF65-F5344CB8AC3E}">
-        <p14:creationId xmlns:p14="http://schemas.microsoft.com/office/powerpoint/2010/main" val="1685964667"/>
+        <p14:creationId xmlns:p14="http://schemas.microsoft.com/office/powerpoint/2010/main" val="3135760272"/>
       </p:ext>
     </p:extLst>
   </p:cSld>
@@ -1463,7 +1463,7 @@
           <a:p>
             <a:fld id="{D997B5FA-0921-464F-AAE1-844C04324D75}" type="datetimeFigureOut">
               <a:rPr lang="zh-CN" altLang="en-US" smtClean="0"/>
-              <a:t>2018/12/18</a:t>
+              <a:t>2018/12/20</a:t>
             </a:fld>
             <a:endParaRPr lang="zh-CN" altLang="en-US"/>
           </a:p>
@@ -1626,7 +1626,7 @@
           <a:p>
             <a:fld id="{D997B5FA-0921-464F-AAE1-844C04324D75}" type="datetimeFigureOut">
               <a:rPr lang="zh-CN" altLang="en-US" smtClean="0"/>
-              <a:t>2018/12/18</a:t>
+              <a:t>2018/12/20</a:t>
             </a:fld>
             <a:endParaRPr lang="zh-CN" altLang="en-US"/>
           </a:p>
@@ -1799,7 +1799,7 @@
           <a:p>
             <a:fld id="{D997B5FA-0921-464F-AAE1-844C04324D75}" type="datetimeFigureOut">
               <a:rPr lang="zh-CN" altLang="en-US" smtClean="0"/>
-              <a:t>2018/12/18</a:t>
+              <a:t>2018/12/20</a:t>
             </a:fld>
             <a:endParaRPr lang="zh-CN" altLang="en-US"/>
           </a:p>
@@ -1962,7 +1962,7 @@
           <a:p>
             <a:fld id="{D997B5FA-0921-464F-AAE1-844C04324D75}" type="datetimeFigureOut">
               <a:rPr lang="zh-CN" altLang="en-US" smtClean="0"/>
-              <a:t>2018/12/18</a:t>
+              <a:t>2018/12/20</a:t>
             </a:fld>
             <a:endParaRPr lang="zh-CN" altLang="en-US"/>
           </a:p>
@@ -2202,7 +2202,7 @@
           <a:p>
             <a:fld id="{D997B5FA-0921-464F-AAE1-844C04324D75}" type="datetimeFigureOut">
               <a:rPr lang="zh-CN" altLang="en-US" smtClean="0"/>
-              <a:t>2018/12/18</a:t>
+              <a:t>2018/12/20</a:t>
             </a:fld>
             <a:endParaRPr lang="zh-CN" altLang="en-US"/>
           </a:p>
@@ -2426,7 +2426,7 @@
           <a:p>
             <a:fld id="{D997B5FA-0921-464F-AAE1-844C04324D75}" type="datetimeFigureOut">
               <a:rPr lang="zh-CN" altLang="en-US" smtClean="0"/>
-              <a:t>2018/12/18</a:t>
+              <a:t>2018/12/20</a:t>
             </a:fld>
             <a:endParaRPr lang="zh-CN" altLang="en-US"/>
           </a:p>
@@ -2785,7 +2785,7 @@
           <a:p>
             <a:fld id="{D997B5FA-0921-464F-AAE1-844C04324D75}" type="datetimeFigureOut">
               <a:rPr lang="zh-CN" altLang="en-US" smtClean="0"/>
-              <a:t>2018/12/18</a:t>
+              <a:t>2018/12/20</a:t>
             </a:fld>
             <a:endParaRPr lang="zh-CN" altLang="en-US"/>
           </a:p>
@@ -3031,7 +3031,7 @@
           <a:p>
             <a:fld id="{D997B5FA-0921-464F-AAE1-844C04324D75}" type="datetimeFigureOut">
               <a:rPr lang="zh-CN" altLang="en-US" smtClean="0"/>
-              <a:t>2018/12/18</a:t>
+              <a:t>2018/12/20</a:t>
             </a:fld>
             <a:endParaRPr lang="zh-CN" altLang="en-US"/>
           </a:p>
@@ -3301,7 +3301,7 @@
           <a:p>
             <a:fld id="{D997B5FA-0921-464F-AAE1-844C04324D75}" type="datetimeFigureOut">
               <a:rPr lang="zh-CN" altLang="en-US" smtClean="0"/>
-              <a:t>2018/12/18</a:t>
+              <a:t>2018/12/20</a:t>
             </a:fld>
             <a:endParaRPr lang="zh-CN" altLang="en-US"/>
           </a:p>
@@ -3548,7 +3548,7 @@
           <a:p>
             <a:fld id="{D997B5FA-0921-464F-AAE1-844C04324D75}" type="datetimeFigureOut">
               <a:rPr lang="zh-CN" altLang="en-US" smtClean="0"/>
-              <a:t>2018/12/18</a:t>
+              <a:t>2018/12/20</a:t>
             </a:fld>
             <a:endParaRPr lang="zh-CN" altLang="en-US"/>
           </a:p>
@@ -3763,7 +3763,7 @@
           <a:p>
             <a:fld id="{D997B5FA-0921-464F-AAE1-844C04324D75}" type="datetimeFigureOut">
               <a:rPr lang="zh-CN" altLang="en-US" smtClean="0"/>
-              <a:t>2018/12/18</a:t>
+              <a:t>2018/12/20</a:t>
             </a:fld>
             <a:endParaRPr lang="zh-CN" altLang="en-US"/>
           </a:p>
@@ -5017,622 +5017,165 @@
           </a:p>
         </p:txBody>
       </p:sp>
+      <p:pic>
+        <p:nvPicPr>
+          <p:cNvPr id="5" name="그림 4"/>
+          <p:cNvPicPr>
+            <a:picLocks noChangeAspect="1"/>
+          </p:cNvPicPr>
+          <p:nvPr/>
+        </p:nvPicPr>
+        <p:blipFill>
+          <a:blip r:embed="rId3">
+            <a:extLst>
+              <a:ext uri="{28A0092B-C50C-407E-A947-70E740481C1C}">
+                <a14:useLocalDpi xmlns:a14="http://schemas.microsoft.com/office/drawing/2010/main" val="0"/>
+              </a:ext>
+            </a:extLst>
+          </a:blip>
+          <a:stretch>
+            <a:fillRect/>
+          </a:stretch>
+        </p:blipFill>
+        <p:spPr>
+          <a:xfrm>
+            <a:off x="1613140" y="1532534"/>
+            <a:ext cx="7858125" cy="4757738"/>
+          </a:xfrm>
+          <a:prstGeom prst="rect">
+            <a:avLst/>
+          </a:prstGeom>
+        </p:spPr>
+      </p:pic>
       <p:sp>
         <p:nvSpPr>
-          <p:cNvPr id="3" name="직사각형 2"/>
-          <p:cNvSpPr/>
+          <p:cNvPr id="7" name="TextBox 6"/>
+          <p:cNvSpPr txBox="1"/>
           <p:nvPr/>
         </p:nvSpPr>
         <p:spPr>
           <a:xfrm>
-            <a:off x="1207697" y="1806627"/>
-            <a:ext cx="9583948" cy="3970318"/>
+            <a:off x="8476518" y="2407526"/>
+            <a:ext cx="646331" cy="369332"/>
           </a:xfrm>
           <a:prstGeom prst="rect">
             <a:avLst/>
           </a:prstGeom>
-          <a:solidFill>
-            <a:schemeClr val="tx1">
-              <a:lumMod val="85000"/>
-              <a:lumOff val="15000"/>
-            </a:schemeClr>
-          </a:solidFill>
+          <a:noFill/>
         </p:spPr>
         <p:txBody>
-          <a:bodyPr wrap="square">
+          <a:bodyPr wrap="none" rtlCol="0">
             <a:spAutoFit/>
           </a:bodyPr>
           <a:lstStyle/>
           <a:p>
-            <a:endParaRPr lang="en-US" altLang="ko-KR" dirty="0" smtClean="0">
-              <a:solidFill>
-                <a:srgbClr val="C586C0"/>
-              </a:solidFill>
-              <a:latin typeface="Consolas" panose="020B0609020204030204" pitchFamily="49" charset="0"/>
-            </a:endParaRPr>
-          </a:p>
-          <a:p>
-            <a:endParaRPr lang="en-US" altLang="ko-KR" dirty="0">
-              <a:solidFill>
-                <a:srgbClr val="C586C0"/>
-              </a:solidFill>
-              <a:latin typeface="Consolas" panose="020B0609020204030204" pitchFamily="49" charset="0"/>
-            </a:endParaRPr>
-          </a:p>
-          <a:p>
-            <a:endParaRPr lang="en-US" altLang="ko-KR" dirty="0" smtClean="0">
-              <a:solidFill>
-                <a:srgbClr val="C586C0"/>
-              </a:solidFill>
-              <a:latin typeface="Consolas" panose="020B0609020204030204" pitchFamily="49" charset="0"/>
-            </a:endParaRPr>
-          </a:p>
-          <a:p>
             <a:r>
               <a:rPr lang="en-US" altLang="ko-KR" dirty="0" smtClean="0">
                 <a:solidFill>
-                  <a:srgbClr val="C586C0"/>
+                  <a:srgbClr val="FF0000"/>
                 </a:solidFill>
-                <a:latin typeface="Consolas" panose="020B0609020204030204" pitchFamily="49" charset="0"/>
               </a:rPr>
-              <a:t>for</a:t>
-            </a:r>
+              <a:t>93%</a:t>
+            </a:r>
+          </a:p>
+        </p:txBody>
+      </p:sp>
+      <p:sp>
+        <p:nvSpPr>
+          <p:cNvPr id="8" name="TextBox 7"/>
+          <p:cNvSpPr txBox="1"/>
+          <p:nvPr/>
+        </p:nvSpPr>
+        <p:spPr>
+          <a:xfrm>
+            <a:off x="8476519" y="2897791"/>
+            <a:ext cx="646331" cy="369332"/>
+          </a:xfrm>
+          <a:prstGeom prst="rect">
+            <a:avLst/>
+          </a:prstGeom>
+          <a:noFill/>
+        </p:spPr>
+        <p:txBody>
+          <a:bodyPr wrap="none" rtlCol="0">
+            <a:spAutoFit/>
+          </a:bodyPr>
+          <a:lstStyle/>
+          <a:p>
             <a:r>
               <a:rPr lang="en-US" altLang="ko-KR" dirty="0" smtClean="0">
                 <a:solidFill>
-                  <a:srgbClr val="D4D4D4"/>
+                  <a:srgbClr val="FF0000"/>
                 </a:solidFill>
-                <a:latin typeface="Consolas" panose="020B0609020204030204" pitchFamily="49" charset="0"/>
               </a:rPr>
-              <a:t> </a:t>
-            </a:r>
-            <a:r>
-              <a:rPr lang="en-US" altLang="ko-KR" dirty="0">
+              <a:t>89%</a:t>
+            </a:r>
+          </a:p>
+        </p:txBody>
+      </p:sp>
+      <p:sp>
+        <p:nvSpPr>
+          <p:cNvPr id="9" name="TextBox 8"/>
+          <p:cNvSpPr txBox="1"/>
+          <p:nvPr/>
+        </p:nvSpPr>
+        <p:spPr>
+          <a:xfrm>
+            <a:off x="8477058" y="3651849"/>
+            <a:ext cx="646331" cy="369332"/>
+          </a:xfrm>
+          <a:prstGeom prst="rect">
+            <a:avLst/>
+          </a:prstGeom>
+          <a:noFill/>
+        </p:spPr>
+        <p:txBody>
+          <a:bodyPr wrap="none" rtlCol="0">
+            <a:spAutoFit/>
+          </a:bodyPr>
+          <a:lstStyle/>
+          <a:p>
+            <a:r>
+              <a:rPr lang="en-US" altLang="ko-KR" dirty="0" smtClean="0">
                 <a:solidFill>
-                  <a:srgbClr val="D4D4D4"/>
+                  <a:srgbClr val="FF0000"/>
                 </a:solidFill>
-                <a:latin typeface="Consolas" panose="020B0609020204030204" pitchFamily="49" charset="0"/>
               </a:rPr>
-              <a:t>epoch </a:t>
-            </a:r>
-            <a:r>
-              <a:rPr lang="en-US" altLang="ko-KR" dirty="0">
+              <a:t>73%</a:t>
+            </a:r>
+          </a:p>
+        </p:txBody>
+      </p:sp>
+      <p:sp>
+        <p:nvSpPr>
+          <p:cNvPr id="10" name="TextBox 9"/>
+          <p:cNvSpPr txBox="1"/>
+          <p:nvPr/>
+        </p:nvSpPr>
+        <p:spPr>
+          <a:xfrm>
+            <a:off x="8476517" y="2038194"/>
+            <a:ext cx="646331" cy="369332"/>
+          </a:xfrm>
+          <a:prstGeom prst="rect">
+            <a:avLst/>
+          </a:prstGeom>
+          <a:noFill/>
+        </p:spPr>
+        <p:txBody>
+          <a:bodyPr wrap="none" rtlCol="0">
+            <a:spAutoFit/>
+          </a:bodyPr>
+          <a:lstStyle/>
+          <a:p>
+            <a:r>
+              <a:rPr lang="en-US" altLang="ko-KR" dirty="0" smtClean="0">
                 <a:solidFill>
-                  <a:srgbClr val="569CD6"/>
+                  <a:srgbClr val="FF0000"/>
                 </a:solidFill>
-                <a:latin typeface="Consolas" panose="020B0609020204030204" pitchFamily="49" charset="0"/>
               </a:rPr>
-              <a:t>in</a:t>
-            </a:r>
-            <a:r>
-              <a:rPr lang="en-US" altLang="ko-KR" dirty="0">
-                <a:solidFill>
-                  <a:srgbClr val="D4D4D4"/>
-                </a:solidFill>
-                <a:latin typeface="Consolas" panose="020B0609020204030204" pitchFamily="49" charset="0"/>
-              </a:rPr>
-              <a:t> </a:t>
-            </a:r>
-            <a:r>
-              <a:rPr lang="en-US" altLang="ko-KR" dirty="0">
-                <a:solidFill>
-                  <a:srgbClr val="DCDCAA"/>
-                </a:solidFill>
-                <a:latin typeface="Consolas" panose="020B0609020204030204" pitchFamily="49" charset="0"/>
-              </a:rPr>
-              <a:t>range</a:t>
-            </a:r>
-            <a:r>
-              <a:rPr lang="en-US" altLang="ko-KR" dirty="0">
-                <a:solidFill>
-                  <a:srgbClr val="D4D4D4"/>
-                </a:solidFill>
-                <a:latin typeface="Consolas" panose="020B0609020204030204" pitchFamily="49" charset="0"/>
-              </a:rPr>
-              <a:t>(</a:t>
-            </a:r>
-            <a:r>
-              <a:rPr lang="en-US" altLang="ko-KR" dirty="0" err="1">
-                <a:solidFill>
-                  <a:srgbClr val="D4D4D4"/>
-                </a:solidFill>
-                <a:latin typeface="Consolas" panose="020B0609020204030204" pitchFamily="49" charset="0"/>
-              </a:rPr>
-              <a:t>training_epochs</a:t>
-            </a:r>
-            <a:r>
-              <a:rPr lang="en-US" altLang="ko-KR" dirty="0">
-                <a:solidFill>
-                  <a:srgbClr val="D4D4D4"/>
-                </a:solidFill>
-                <a:latin typeface="Consolas" panose="020B0609020204030204" pitchFamily="49" charset="0"/>
-              </a:rPr>
-              <a:t>): </a:t>
-            </a:r>
-            <a:r>
-              <a:rPr lang="en-US" altLang="ko-KR" dirty="0">
-                <a:solidFill>
-                  <a:srgbClr val="6A9955"/>
-                </a:solidFill>
-                <a:latin typeface="Consolas" panose="020B0609020204030204" pitchFamily="49" charset="0"/>
-              </a:rPr>
-              <a:t># epoch </a:t>
-            </a:r>
-            <a:r>
-              <a:rPr lang="ko-KR" altLang="en-US" dirty="0">
-                <a:solidFill>
-                  <a:srgbClr val="6A9955"/>
-                </a:solidFill>
-                <a:latin typeface="Consolas" panose="020B0609020204030204" pitchFamily="49" charset="0"/>
-              </a:rPr>
-              <a:t>만큼 수행</a:t>
-            </a:r>
-            <a:endParaRPr lang="ko-KR" altLang="en-US" dirty="0">
-              <a:solidFill>
-                <a:srgbClr val="D4D4D4"/>
-              </a:solidFill>
-              <a:latin typeface="Consolas" panose="020B0609020204030204" pitchFamily="49" charset="0"/>
-            </a:endParaRPr>
-          </a:p>
-          <a:p>
-            <a:r>
-              <a:rPr lang="en-US" altLang="ko-KR" dirty="0" err="1">
-                <a:solidFill>
-                  <a:srgbClr val="D4D4D4"/>
-                </a:solidFill>
-                <a:latin typeface="Consolas" panose="020B0609020204030204" pitchFamily="49" charset="0"/>
-              </a:rPr>
-              <a:t>avg_cost</a:t>
-            </a:r>
-            <a:r>
-              <a:rPr lang="en-US" altLang="ko-KR" dirty="0">
-                <a:solidFill>
-                  <a:srgbClr val="D4D4D4"/>
-                </a:solidFill>
-                <a:latin typeface="Consolas" panose="020B0609020204030204" pitchFamily="49" charset="0"/>
-              </a:rPr>
-              <a:t> = </a:t>
-            </a:r>
-            <a:r>
-              <a:rPr lang="en-US" altLang="ko-KR" dirty="0">
-                <a:solidFill>
-                  <a:srgbClr val="B5CEA8"/>
-                </a:solidFill>
-                <a:latin typeface="Consolas" panose="020B0609020204030204" pitchFamily="49" charset="0"/>
-              </a:rPr>
-              <a:t>0</a:t>
-            </a:r>
-            <a:endParaRPr lang="en-US" altLang="ko-KR" dirty="0">
-              <a:solidFill>
-                <a:srgbClr val="D4D4D4"/>
-              </a:solidFill>
-              <a:latin typeface="Consolas" panose="020B0609020204030204" pitchFamily="49" charset="0"/>
-            </a:endParaRPr>
-          </a:p>
-          <a:p>
-            <a:r>
-              <a:rPr lang="en-US" altLang="ko-KR" dirty="0">
-                <a:solidFill>
-                  <a:srgbClr val="D4D4D4"/>
-                </a:solidFill>
-                <a:latin typeface="Consolas" panose="020B0609020204030204" pitchFamily="49" charset="0"/>
-              </a:rPr>
-              <a:t/>
-            </a:r>
-            <a:br>
-              <a:rPr lang="en-US" altLang="ko-KR" dirty="0">
-                <a:solidFill>
-                  <a:srgbClr val="D4D4D4"/>
-                </a:solidFill>
-                <a:latin typeface="Consolas" panose="020B0609020204030204" pitchFamily="49" charset="0"/>
-              </a:rPr>
-            </a:br>
-            <a:r>
-              <a:rPr lang="en-US" altLang="ko-KR" dirty="0">
-                <a:solidFill>
-                  <a:srgbClr val="C586C0"/>
-                </a:solidFill>
-                <a:latin typeface="Consolas" panose="020B0609020204030204" pitchFamily="49" charset="0"/>
-              </a:rPr>
-              <a:t>for</a:t>
-            </a:r>
-            <a:r>
-              <a:rPr lang="en-US" altLang="ko-KR" dirty="0">
-                <a:solidFill>
-                  <a:srgbClr val="D4D4D4"/>
-                </a:solidFill>
-                <a:latin typeface="Consolas" panose="020B0609020204030204" pitchFamily="49" charset="0"/>
-              </a:rPr>
-              <a:t> </a:t>
-            </a:r>
-            <a:r>
-              <a:rPr lang="en-US" altLang="ko-KR" dirty="0" err="1">
-                <a:solidFill>
-                  <a:srgbClr val="D4D4D4"/>
-                </a:solidFill>
-                <a:latin typeface="Consolas" panose="020B0609020204030204" pitchFamily="49" charset="0"/>
-              </a:rPr>
-              <a:t>i</a:t>
-            </a:r>
-            <a:r>
-              <a:rPr lang="en-US" altLang="ko-KR" dirty="0">
-                <a:solidFill>
-                  <a:srgbClr val="D4D4D4"/>
-                </a:solidFill>
-                <a:latin typeface="Consolas" panose="020B0609020204030204" pitchFamily="49" charset="0"/>
-              </a:rPr>
-              <a:t> </a:t>
-            </a:r>
-            <a:r>
-              <a:rPr lang="en-US" altLang="ko-KR" dirty="0">
-                <a:solidFill>
-                  <a:srgbClr val="569CD6"/>
-                </a:solidFill>
-                <a:latin typeface="Consolas" panose="020B0609020204030204" pitchFamily="49" charset="0"/>
-              </a:rPr>
-              <a:t>in</a:t>
-            </a:r>
-            <a:r>
-              <a:rPr lang="en-US" altLang="ko-KR" dirty="0">
-                <a:solidFill>
-                  <a:srgbClr val="D4D4D4"/>
-                </a:solidFill>
-                <a:latin typeface="Consolas" panose="020B0609020204030204" pitchFamily="49" charset="0"/>
-              </a:rPr>
-              <a:t> </a:t>
-            </a:r>
-            <a:r>
-              <a:rPr lang="en-US" altLang="ko-KR" dirty="0">
-                <a:solidFill>
-                  <a:srgbClr val="DCDCAA"/>
-                </a:solidFill>
-                <a:latin typeface="Consolas" panose="020B0609020204030204" pitchFamily="49" charset="0"/>
-              </a:rPr>
-              <a:t>range</a:t>
-            </a:r>
-            <a:r>
-              <a:rPr lang="en-US" altLang="ko-KR" dirty="0">
-                <a:solidFill>
-                  <a:srgbClr val="D4D4D4"/>
-                </a:solidFill>
-                <a:latin typeface="Consolas" panose="020B0609020204030204" pitchFamily="49" charset="0"/>
-              </a:rPr>
-              <a:t>(</a:t>
-            </a:r>
-            <a:r>
-              <a:rPr lang="en-US" altLang="ko-KR" dirty="0" err="1">
-                <a:solidFill>
-                  <a:srgbClr val="D4D4D4"/>
-                </a:solidFill>
-                <a:latin typeface="Consolas" panose="020B0609020204030204" pitchFamily="49" charset="0"/>
-              </a:rPr>
-              <a:t>total_batch</a:t>
-            </a:r>
-            <a:r>
-              <a:rPr lang="en-US" altLang="ko-KR" dirty="0">
-                <a:solidFill>
-                  <a:srgbClr val="D4D4D4"/>
-                </a:solidFill>
-                <a:latin typeface="Consolas" panose="020B0609020204030204" pitchFamily="49" charset="0"/>
-              </a:rPr>
-              <a:t>): </a:t>
-            </a:r>
-            <a:r>
-              <a:rPr lang="en-US" altLang="ko-KR" dirty="0">
-                <a:solidFill>
-                  <a:srgbClr val="6A9955"/>
-                </a:solidFill>
-                <a:latin typeface="Consolas" panose="020B0609020204030204" pitchFamily="49" charset="0"/>
-              </a:rPr>
-              <a:t># </a:t>
-            </a:r>
-            <a:r>
-              <a:rPr lang="ko-KR" altLang="en-US" dirty="0">
-                <a:solidFill>
-                  <a:srgbClr val="6A9955"/>
-                </a:solidFill>
-                <a:latin typeface="Consolas" panose="020B0609020204030204" pitchFamily="49" charset="0"/>
-              </a:rPr>
-              <a:t>한번에 학습할 데이터 량</a:t>
-            </a:r>
-            <a:endParaRPr lang="ko-KR" altLang="en-US" dirty="0">
-              <a:solidFill>
-                <a:srgbClr val="D4D4D4"/>
-              </a:solidFill>
-              <a:latin typeface="Consolas" panose="020B0609020204030204" pitchFamily="49" charset="0"/>
-            </a:endParaRPr>
-          </a:p>
-          <a:p>
-            <a:r>
-              <a:rPr lang="en-US" altLang="ko-KR" dirty="0" err="1">
-                <a:solidFill>
-                  <a:srgbClr val="D4D4D4"/>
-                </a:solidFill>
-                <a:latin typeface="Consolas" panose="020B0609020204030204" pitchFamily="49" charset="0"/>
-              </a:rPr>
-              <a:t>batch_xs</a:t>
-            </a:r>
-            <a:r>
-              <a:rPr lang="en-US" altLang="ko-KR" dirty="0">
-                <a:solidFill>
-                  <a:srgbClr val="D4D4D4"/>
-                </a:solidFill>
-                <a:latin typeface="Consolas" panose="020B0609020204030204" pitchFamily="49" charset="0"/>
-              </a:rPr>
-              <a:t>, </a:t>
-            </a:r>
-            <a:r>
-              <a:rPr lang="en-US" altLang="ko-KR" dirty="0" err="1">
-                <a:solidFill>
-                  <a:srgbClr val="D4D4D4"/>
-                </a:solidFill>
-                <a:latin typeface="Consolas" panose="020B0609020204030204" pitchFamily="49" charset="0"/>
-              </a:rPr>
-              <a:t>batch_ys</a:t>
-            </a:r>
-            <a:r>
-              <a:rPr lang="en-US" altLang="ko-KR" dirty="0">
-                <a:solidFill>
-                  <a:srgbClr val="D4D4D4"/>
-                </a:solidFill>
-                <a:latin typeface="Consolas" panose="020B0609020204030204" pitchFamily="49" charset="0"/>
-              </a:rPr>
-              <a:t> = </a:t>
-            </a:r>
-            <a:r>
-              <a:rPr lang="en-US" altLang="ko-KR" dirty="0" err="1">
-                <a:solidFill>
-                  <a:srgbClr val="D4D4D4"/>
-                </a:solidFill>
-                <a:latin typeface="Consolas" panose="020B0609020204030204" pitchFamily="49" charset="0"/>
-              </a:rPr>
-              <a:t>mnist.train.next_batch</a:t>
-            </a:r>
-            <a:r>
-              <a:rPr lang="en-US" altLang="ko-KR" dirty="0">
-                <a:solidFill>
-                  <a:srgbClr val="D4D4D4"/>
-                </a:solidFill>
-                <a:latin typeface="Consolas" panose="020B0609020204030204" pitchFamily="49" charset="0"/>
-              </a:rPr>
-              <a:t>(</a:t>
-            </a:r>
-            <a:r>
-              <a:rPr lang="en-US" altLang="ko-KR" dirty="0" err="1">
-                <a:solidFill>
-                  <a:srgbClr val="D4D4D4"/>
-                </a:solidFill>
-                <a:latin typeface="Consolas" panose="020B0609020204030204" pitchFamily="49" charset="0"/>
-              </a:rPr>
-              <a:t>batch_size</a:t>
-            </a:r>
-            <a:r>
-              <a:rPr lang="en-US" altLang="ko-KR" dirty="0">
-                <a:solidFill>
-                  <a:srgbClr val="D4D4D4"/>
-                </a:solidFill>
-                <a:latin typeface="Consolas" panose="020B0609020204030204" pitchFamily="49" charset="0"/>
-              </a:rPr>
-              <a:t>)</a:t>
-            </a:r>
-          </a:p>
-          <a:p>
-            <a:r>
-              <a:rPr lang="en-US" altLang="ko-KR" dirty="0" err="1">
-                <a:solidFill>
-                  <a:srgbClr val="D4D4D4"/>
-                </a:solidFill>
-                <a:latin typeface="Consolas" panose="020B0609020204030204" pitchFamily="49" charset="0"/>
-              </a:rPr>
-              <a:t>feed_dict</a:t>
-            </a:r>
-            <a:r>
-              <a:rPr lang="en-US" altLang="ko-KR" dirty="0">
-                <a:solidFill>
-                  <a:srgbClr val="D4D4D4"/>
-                </a:solidFill>
-                <a:latin typeface="Consolas" panose="020B0609020204030204" pitchFamily="49" charset="0"/>
-              </a:rPr>
-              <a:t> = {X: </a:t>
-            </a:r>
-            <a:r>
-              <a:rPr lang="en-US" altLang="ko-KR" dirty="0" err="1">
-                <a:solidFill>
-                  <a:srgbClr val="D4D4D4"/>
-                </a:solidFill>
-                <a:latin typeface="Consolas" panose="020B0609020204030204" pitchFamily="49" charset="0"/>
-              </a:rPr>
-              <a:t>batch_xs</a:t>
-            </a:r>
-            <a:r>
-              <a:rPr lang="en-US" altLang="ko-KR" dirty="0">
-                <a:solidFill>
-                  <a:srgbClr val="D4D4D4"/>
-                </a:solidFill>
-                <a:latin typeface="Consolas" panose="020B0609020204030204" pitchFamily="49" charset="0"/>
-              </a:rPr>
-              <a:t>, Y: </a:t>
-            </a:r>
-            <a:r>
-              <a:rPr lang="en-US" altLang="ko-KR" dirty="0" err="1">
-                <a:solidFill>
-                  <a:srgbClr val="D4D4D4"/>
-                </a:solidFill>
-                <a:latin typeface="Consolas" panose="020B0609020204030204" pitchFamily="49" charset="0"/>
-              </a:rPr>
-              <a:t>batch_ys</a:t>
-            </a:r>
-            <a:r>
-              <a:rPr lang="en-US" altLang="ko-KR" dirty="0">
-                <a:solidFill>
-                  <a:srgbClr val="D4D4D4"/>
-                </a:solidFill>
-                <a:latin typeface="Consolas" panose="020B0609020204030204" pitchFamily="49" charset="0"/>
-              </a:rPr>
-              <a:t>, </a:t>
-            </a:r>
-            <a:r>
-              <a:rPr lang="en-US" altLang="ko-KR" dirty="0" err="1">
-                <a:solidFill>
-                  <a:srgbClr val="D4D4D4"/>
-                </a:solidFill>
-                <a:latin typeface="Consolas" panose="020B0609020204030204" pitchFamily="49" charset="0"/>
-              </a:rPr>
-              <a:t>keep_prob</a:t>
-            </a:r>
-            <a:r>
-              <a:rPr lang="en-US" altLang="ko-KR" dirty="0">
-                <a:solidFill>
-                  <a:srgbClr val="D4D4D4"/>
-                </a:solidFill>
-                <a:latin typeface="Consolas" panose="020B0609020204030204" pitchFamily="49" charset="0"/>
-              </a:rPr>
-              <a:t>: </a:t>
-            </a:r>
-            <a:r>
-              <a:rPr lang="en-US" altLang="ko-KR" dirty="0">
-                <a:solidFill>
-                  <a:srgbClr val="B5CEA8"/>
-                </a:solidFill>
-                <a:latin typeface="Consolas" panose="020B0609020204030204" pitchFamily="49" charset="0"/>
-              </a:rPr>
-              <a:t>0.7</a:t>
-            </a:r>
-            <a:r>
-              <a:rPr lang="en-US" altLang="ko-KR" dirty="0">
-                <a:solidFill>
-                  <a:srgbClr val="D4D4D4"/>
-                </a:solidFill>
-                <a:latin typeface="Consolas" panose="020B0609020204030204" pitchFamily="49" charset="0"/>
-              </a:rPr>
-              <a:t>}</a:t>
-            </a:r>
-          </a:p>
-          <a:p>
-            <a:r>
-              <a:rPr lang="en-US" altLang="ko-KR" dirty="0">
-                <a:solidFill>
-                  <a:srgbClr val="D4D4D4"/>
-                </a:solidFill>
-                <a:latin typeface="Consolas" panose="020B0609020204030204" pitchFamily="49" charset="0"/>
-              </a:rPr>
-              <a:t>c, _ = </a:t>
-            </a:r>
-            <a:r>
-              <a:rPr lang="en-US" altLang="ko-KR" dirty="0" err="1">
-                <a:solidFill>
-                  <a:srgbClr val="D4D4D4"/>
-                </a:solidFill>
-                <a:latin typeface="Consolas" panose="020B0609020204030204" pitchFamily="49" charset="0"/>
-              </a:rPr>
-              <a:t>sess.run</a:t>
-            </a:r>
-            <a:r>
-              <a:rPr lang="en-US" altLang="ko-KR" dirty="0">
-                <a:solidFill>
-                  <a:srgbClr val="D4D4D4"/>
-                </a:solidFill>
-                <a:latin typeface="Consolas" panose="020B0609020204030204" pitchFamily="49" charset="0"/>
-              </a:rPr>
-              <a:t>([cost, optimizer], </a:t>
-            </a:r>
-            <a:r>
-              <a:rPr lang="en-US" altLang="ko-KR" dirty="0" err="1">
-                <a:solidFill>
-                  <a:srgbClr val="9CDCFE"/>
-                </a:solidFill>
-                <a:latin typeface="Consolas" panose="020B0609020204030204" pitchFamily="49" charset="0"/>
-              </a:rPr>
-              <a:t>feed_dict</a:t>
-            </a:r>
-            <a:r>
-              <a:rPr lang="en-US" altLang="ko-KR" dirty="0">
-                <a:solidFill>
-                  <a:srgbClr val="D4D4D4"/>
-                </a:solidFill>
-                <a:latin typeface="Consolas" panose="020B0609020204030204" pitchFamily="49" charset="0"/>
-              </a:rPr>
-              <a:t>=</a:t>
-            </a:r>
-            <a:r>
-              <a:rPr lang="en-US" altLang="ko-KR" dirty="0" err="1">
-                <a:solidFill>
-                  <a:srgbClr val="D4D4D4"/>
-                </a:solidFill>
-                <a:latin typeface="Consolas" panose="020B0609020204030204" pitchFamily="49" charset="0"/>
-              </a:rPr>
-              <a:t>feed_dict</a:t>
-            </a:r>
-            <a:r>
-              <a:rPr lang="en-US" altLang="ko-KR" dirty="0">
-                <a:solidFill>
-                  <a:srgbClr val="D4D4D4"/>
-                </a:solidFill>
-                <a:latin typeface="Consolas" panose="020B0609020204030204" pitchFamily="49" charset="0"/>
-              </a:rPr>
-              <a:t>)</a:t>
-            </a:r>
-          </a:p>
-          <a:p>
-            <a:r>
-              <a:rPr lang="en-US" altLang="ko-KR" dirty="0" err="1">
-                <a:solidFill>
-                  <a:srgbClr val="D4D4D4"/>
-                </a:solidFill>
-                <a:latin typeface="Consolas" panose="020B0609020204030204" pitchFamily="49" charset="0"/>
-              </a:rPr>
-              <a:t>avg_cost</a:t>
-            </a:r>
-            <a:r>
-              <a:rPr lang="en-US" altLang="ko-KR" dirty="0">
-                <a:solidFill>
-                  <a:srgbClr val="D4D4D4"/>
-                </a:solidFill>
-                <a:latin typeface="Consolas" panose="020B0609020204030204" pitchFamily="49" charset="0"/>
-              </a:rPr>
-              <a:t> += c / </a:t>
-            </a:r>
-            <a:r>
-              <a:rPr lang="en-US" altLang="ko-KR" dirty="0" err="1" smtClean="0">
-                <a:solidFill>
-                  <a:srgbClr val="D4D4D4"/>
-                </a:solidFill>
-                <a:latin typeface="Consolas" panose="020B0609020204030204" pitchFamily="49" charset="0"/>
-              </a:rPr>
-              <a:t>total_batch</a:t>
-            </a:r>
-            <a:endParaRPr lang="en-US" altLang="ko-KR" dirty="0" smtClean="0">
-              <a:solidFill>
-                <a:srgbClr val="D4D4D4"/>
-              </a:solidFill>
-              <a:latin typeface="Consolas" panose="020B0609020204030204" pitchFamily="49" charset="0"/>
-            </a:endParaRPr>
-          </a:p>
-          <a:p>
-            <a:endParaRPr lang="en-US" altLang="ko-KR" b="0" dirty="0">
-              <a:solidFill>
-                <a:srgbClr val="D4D4D4"/>
-              </a:solidFill>
-              <a:effectLst/>
-              <a:latin typeface="Consolas" panose="020B0609020204030204" pitchFamily="49" charset="0"/>
-            </a:endParaRPr>
-          </a:p>
-          <a:p>
-            <a:endParaRPr lang="en-US" altLang="ko-KR" dirty="0" smtClean="0">
-              <a:solidFill>
-                <a:srgbClr val="D4D4D4"/>
-              </a:solidFill>
-              <a:latin typeface="Consolas" panose="020B0609020204030204" pitchFamily="49" charset="0"/>
-            </a:endParaRPr>
-          </a:p>
-          <a:p>
-            <a:endParaRPr lang="en-US" altLang="ko-KR" b="0" dirty="0">
-              <a:solidFill>
-                <a:srgbClr val="D4D4D4"/>
-              </a:solidFill>
-              <a:effectLst/>
-              <a:latin typeface="Consolas" panose="020B0609020204030204" pitchFamily="49" charset="0"/>
-            </a:endParaRPr>
+              <a:t>96%</a:t>
+            </a:r>
           </a:p>
         </p:txBody>
       </p:sp>
@@ -10074,7 +9617,23 @@
                   <a:schemeClr val="bg1"/>
                 </a:solidFill>
               </a:rPr>
-              <a:t>의 트레이닝 결과 향상 시키는 방법</a:t>
+              <a:t>의 트레이닝 </a:t>
+            </a:r>
+            <a:r>
+              <a:rPr lang="ko-KR" altLang="en-US" sz="4000" dirty="0" smtClean="0">
+                <a:solidFill>
+                  <a:schemeClr val="bg1"/>
+                </a:solidFill>
+              </a:rPr>
+              <a:t>정확도 </a:t>
+            </a:r>
+            <a:r>
+              <a:rPr lang="ko-KR" altLang="en-US" sz="4000" dirty="0" smtClean="0">
+                <a:solidFill>
+                  <a:schemeClr val="bg1"/>
+                </a:solidFill>
+              </a:rPr>
+              <a:t>향상 시키는 방법</a:t>
             </a:r>
             <a:endParaRPr lang="zh-CN" altLang="en-US" sz="4000" dirty="0">
               <a:solidFill>
@@ -11923,7 +11482,7 @@
         <p:spPr bwMode="auto">
           <a:xfrm>
             <a:off x="1950181" y="3341507"/>
-            <a:ext cx="3207921" cy="585288"/>
+            <a:ext cx="3207921" cy="609398"/>
           </a:xfrm>
           <a:prstGeom prst="rect">
             <a:avLst/>
@@ -11983,7 +11542,19 @@
                 </a:solidFill>
                 <a:ea typeface="黑体" panose="02010609060101010101" pitchFamily="49" charset="-122"/>
               </a:rPr>
-              <a:t>90% </a:t>
+              <a:t>73</a:t>
+            </a:r>
+            <a:r>
+              <a:rPr lang="en-US" altLang="zh-CN" sz="1400" dirty="0" smtClean="0">
+                <a:solidFill>
+                  <a:schemeClr val="tx1">
+                    <a:lumMod val="50000"/>
+                    <a:lumOff val="50000"/>
+                  </a:schemeClr>
+                </a:solidFill>
+                <a:ea typeface="黑体" panose="02010609060101010101" pitchFamily="49" charset="-122"/>
+              </a:rPr>
+              <a:t>% </a:t>
             </a:r>
             <a:r>
               <a:rPr lang="ko-KR" altLang="en-US" sz="1400" dirty="0" err="1" smtClean="0">
@@ -12159,7 +11730,7 @@
         <p:spPr bwMode="auto">
           <a:xfrm>
             <a:off x="1950181" y="2727145"/>
-            <a:ext cx="3130142" cy="350865"/>
+            <a:ext cx="3130142" cy="326756"/>
           </a:xfrm>
           <a:prstGeom prst="rect">
             <a:avLst/>
@@ -12204,7 +11775,7 @@
           </a:bodyPr>
           <a:lstStyle/>
           <a:p>
-            <a:pPr algn="ctr">
+            <a:pPr>
               <a:lnSpc>
                 <a:spcPct val="120000"/>
               </a:lnSpc>
@@ -12219,10 +11790,10 @@
                 </a:solidFill>
                 <a:ea typeface="黑体" panose="02010609060101010101" pitchFamily="49" charset="-122"/>
               </a:rPr>
-              <a:t>94% </a:t>
-            </a:r>
-            <a:r>
-              <a:rPr lang="ko-KR" altLang="en-US" sz="1400" dirty="0" err="1" smtClean="0">
+              <a:t>89</a:t>
+            </a:r>
+            <a:r>
+              <a:rPr lang="en-US" altLang="zh-CN" sz="1400" dirty="0" smtClean="0">
                 <a:solidFill>
                   <a:schemeClr val="tx1">
                     <a:lumMod val="50000"/>
@@ -12231,22 +11802,10 @@
                 </a:solidFill>
                 <a:ea typeface="黑体" panose="02010609060101010101" pitchFamily="49" charset="-122"/>
               </a:rPr>
-              <a:t>레이어</a:t>
-            </a:r>
-            <a:r>
-              <a:rPr lang="ko-KR" altLang="en-US" sz="1400" dirty="0" smtClean="0">
-                <a:solidFill>
-                  <a:schemeClr val="tx1">
-                    <a:lumMod val="50000"/>
-                    <a:lumOff val="50000"/>
-                  </a:schemeClr>
-                </a:solidFill>
-                <a:ea typeface="黑体" panose="02010609060101010101" pitchFamily="49" charset="-122"/>
-              </a:rPr>
-              <a:t> 계층을 늘리고 </a:t>
-            </a:r>
-            <a:r>
-              <a:rPr lang="en-US" altLang="ko-KR" sz="1400" dirty="0" err="1" smtClean="0">
+              <a:t>% </a:t>
+            </a:r>
+            <a:r>
+              <a:rPr lang="en-US" altLang="zh-CN" sz="1400" dirty="0" err="1" smtClean="0">
                 <a:solidFill>
                   <a:schemeClr val="tx1">
                     <a:lumMod val="50000"/>
@@ -12258,7 +11817,7 @@
               <a:t>Relu</a:t>
             </a:r>
             <a:r>
-              <a:rPr lang="en-US" altLang="ko-KR" sz="1400" dirty="0" smtClean="0">
+              <a:rPr lang="en-US" altLang="zh-CN" sz="1400" dirty="0" smtClean="0">
                 <a:solidFill>
                   <a:schemeClr val="tx1">
                     <a:lumMod val="50000"/>
@@ -12400,7 +11959,7 @@
           </a:bodyPr>
           <a:lstStyle/>
           <a:p>
-            <a:pPr algn="ctr">
+            <a:pPr>
               <a:lnSpc>
                 <a:spcPct val="120000"/>
               </a:lnSpc>
@@ -12415,7 +11974,19 @@
                 </a:solidFill>
                 <a:ea typeface="黑体" panose="02010609060101010101" pitchFamily="49" charset="-122"/>
               </a:rPr>
-              <a:t>97% Xavier </a:t>
+              <a:t>93% </a:t>
+            </a:r>
+            <a:r>
+              <a:rPr lang="ko-KR" altLang="en-US" sz="1400" dirty="0" err="1" smtClean="0">
+                <a:solidFill>
+                  <a:schemeClr val="tx1">
+                    <a:lumMod val="50000"/>
+                    <a:lumOff val="50000"/>
+                  </a:schemeClr>
+                </a:solidFill>
+                <a:ea typeface="黑体" panose="02010609060101010101" pitchFamily="49" charset="-122"/>
+              </a:rPr>
+              <a:t>학습률</a:t>
             </a:r>
             <a:r>
               <a:rPr lang="ko-KR" altLang="en-US" sz="1400" dirty="0" smtClean="0">
@@ -12427,19 +11998,7 @@
                 </a:solidFill>
                 <a:ea typeface="黑体" panose="02010609060101010101" pitchFamily="49" charset="-122"/>
               </a:rPr>
-              <a:t>를 이용해서 초기화</a:t>
-            </a:r>
-            <a:r>
-              <a:rPr lang="en-US" altLang="zh-CN" sz="1400" dirty="0" smtClean="0">
-                <a:solidFill>
-                  <a:schemeClr val="tx1">
-                    <a:lumMod val="50000"/>
-                    <a:lumOff val="50000"/>
-                  </a:schemeClr>
-                </a:solidFill>
-                <a:ea typeface="黑体" panose="02010609060101010101" pitchFamily="49" charset="-122"/>
-              </a:rPr>
-              <a:t> </a:t>
+              <a:t> 조정</a:t>
             </a:r>
             <a:endParaRPr lang="en-US" altLang="zh-CN" sz="1400" dirty="0">
               <a:solidFill>
@@ -12514,8 +12073,8 @@
         </p:nvSpPr>
         <p:spPr bwMode="auto">
           <a:xfrm>
-            <a:off x="1950181" y="1595257"/>
-            <a:ext cx="3365062" cy="350865"/>
+            <a:off x="1950181" y="1285401"/>
+            <a:ext cx="3365062" cy="609398"/>
           </a:xfrm>
           <a:prstGeom prst="rect">
             <a:avLst/>
@@ -12560,7 +12119,7 @@
           </a:bodyPr>
           <a:lstStyle/>
           <a:p>
-            <a:pPr algn="ctr">
+            <a:pPr>
               <a:lnSpc>
                 <a:spcPct val="120000"/>
               </a:lnSpc>
@@ -12575,10 +12134,10 @@
                 </a:solidFill>
                 <a:ea typeface="黑体" panose="02010609060101010101" pitchFamily="49" charset="-122"/>
               </a:rPr>
-              <a:t>98</a:t>
-            </a:r>
-            <a:r>
-              <a:rPr lang="en-US" altLang="zh-CN" sz="1400" smtClean="0">
+              <a:t>96% </a:t>
+            </a:r>
+            <a:r>
+              <a:rPr lang="ko-KR" altLang="en-US" sz="1400" dirty="0" smtClean="0">
                 <a:solidFill>
                   <a:schemeClr val="tx1">
                     <a:lumMod val="50000"/>
@@ -12587,7 +12146,7 @@
                 </a:solidFill>
                 <a:ea typeface="黑体" panose="02010609060101010101" pitchFamily="49" charset="-122"/>
               </a:rPr>
-              <a:t>% </a:t>
+              <a:t>입력 </a:t>
             </a:r>
             <a:r>
               <a:rPr lang="ko-KR" altLang="en-US" sz="1400" dirty="0" err="1" smtClean="0">
@@ -12599,7 +12158,7 @@
                 </a:solidFill>
                 <a:ea typeface="黑体" panose="02010609060101010101" pitchFamily="49" charset="-122"/>
               </a:rPr>
-              <a:t>레이어</a:t>
+              <a:t>노드</a:t>
             </a:r>
             <a:r>
               <a:rPr lang="ko-KR" altLang="en-US" sz="1400" dirty="0" smtClean="0">
@@ -12611,7 +12170,7 @@
                 </a:solidFill>
                 <a:ea typeface="黑体" panose="02010609060101010101" pitchFamily="49" charset="-122"/>
               </a:rPr>
-              <a:t> 계층을 늘리고</a:t>
+              <a:t> 개수 늘리고 </a:t>
             </a:r>
             <a:r>
               <a:rPr lang="en-US" altLang="zh-CN" sz="1400" dirty="0" smtClean="0">
@@ -12623,7 +12182,19 @@
                 </a:solidFill>
                 <a:ea typeface="黑体" panose="02010609060101010101" pitchFamily="49" charset="-122"/>
               </a:rPr>
-              <a:t>Dropout </a:t>
+              <a:t>Dropout, </a:t>
+            </a:r>
+            <a:r>
+              <a:rPr lang="ko-KR" altLang="en-US" sz="1400" dirty="0" err="1" smtClean="0">
+                <a:solidFill>
+                  <a:schemeClr val="tx1">
+                    <a:lumMod val="50000"/>
+                    <a:lumOff val="50000"/>
+                  </a:schemeClr>
+                </a:solidFill>
+                <a:ea typeface="黑体" panose="02010609060101010101" pitchFamily="49" charset="-122"/>
+              </a:rPr>
+              <a:t>학습률</a:t>
             </a:r>
             <a:r>
               <a:rPr lang="ko-KR" altLang="en-US" sz="1400" dirty="0" smtClean="0">
@@ -12635,9 +12206,9 @@
                 </a:solidFill>
                 <a:ea typeface="黑体" panose="02010609060101010101" pitchFamily="49" charset="-122"/>
               </a:rPr>
-              <a:t>이용</a:t>
-            </a:r>
-            <a:endParaRPr lang="en-US" altLang="zh-CN" sz="1400" dirty="0">
+              <a:t> 조정</a:t>
+            </a:r>
+            <a:endParaRPr lang="en-US" altLang="ko-KR" sz="1400" dirty="0" smtClean="0">
               <a:solidFill>
                 <a:schemeClr val="tx1">
                   <a:lumMod val="50000"/>
@@ -12658,7 +12229,7 @@
         <p:spPr>
           <a:xfrm>
             <a:off x="2039070" y="4864434"/>
-            <a:ext cx="8236199" cy="2354491"/>
+            <a:ext cx="8236199" cy="1938992"/>
           </a:xfrm>
           <a:prstGeom prst="rect">
             <a:avLst/>
@@ -12756,7 +12327,7 @@
                 <a:latin typeface="微软雅黑" panose="020B0503020204020204" pitchFamily="34" charset="-122"/>
                 <a:ea typeface="微软雅黑" panose="020B0503020204020204" pitchFamily="34" charset="-122"/>
               </a:rPr>
-              <a:t>. </a:t>
+              <a:t>.</a:t>
             </a:r>
           </a:p>
           <a:p>
@@ -12765,18 +12336,6 @@
                 <a:spcPct val="150000"/>
               </a:lnSpc>
             </a:pPr>
-            <a:r>
-              <a:rPr lang="en-US" altLang="zh-CN" sz="1600" dirty="0" smtClean="0">
-                <a:solidFill>
-                  <a:schemeClr val="tx1">
-                    <a:lumMod val="50000"/>
-                    <a:lumOff val="50000"/>
-                  </a:schemeClr>
-                </a:solidFill>
-                <a:ea typeface="黑体" panose="02010609060101010101" pitchFamily="49" charset="-122"/>
-              </a:rPr>
-              <a:t>Xavier </a:t>
-            </a:r>
             <a:r>
               <a:rPr lang="ko-KR" altLang="en-US" sz="1600" dirty="0" smtClean="0">
                 <a:solidFill>
@@ -12785,10 +12344,28 @@
                     <a:lumOff val="50000"/>
                   </a:schemeClr>
                 </a:solidFill>
-                <a:ea typeface="黑体" panose="02010609060101010101" pitchFamily="49" charset="-122"/>
+                <a:latin typeface="微软雅黑" panose="020B0503020204020204" pitchFamily="34" charset="-122"/>
+                <a:ea typeface="微软雅黑" panose="020B0503020204020204" pitchFamily="34" charset="-122"/>
               </a:rPr>
-              <a:t>는 초기의 </a:t>
-            </a:r>
+              <a:t>가장 큰 효과를 보였던 변경은 </a:t>
+            </a:r>
+            <a:endParaRPr lang="en-US" altLang="ko-KR" sz="1600" dirty="0" smtClean="0">
+              <a:solidFill>
+                <a:schemeClr val="tx1">
+                  <a:lumMod val="50000"/>
+                  <a:lumOff val="50000"/>
+                </a:schemeClr>
+              </a:solidFill>
+              <a:latin typeface="微软雅黑" panose="020B0503020204020204" pitchFamily="34" charset="-122"/>
+              <a:ea typeface="微软雅黑" panose="020B0503020204020204" pitchFamily="34" charset="-122"/>
+            </a:endParaRPr>
+          </a:p>
+          <a:p>
+            <a:pPr>
+              <a:lnSpc>
+                <a:spcPct val="150000"/>
+              </a:lnSpc>
+            </a:pPr>
             <a:r>
               <a:rPr lang="en-US" altLang="ko-KR" sz="1600" dirty="0" smtClean="0">
                 <a:solidFill>
@@ -12800,7 +12377,7 @@
                 <a:latin typeface="微软雅黑" panose="020B0503020204020204" pitchFamily="34" charset="-122"/>
                 <a:ea typeface="微软雅黑" panose="020B0503020204020204" pitchFamily="34" charset="-122"/>
               </a:rPr>
-              <a:t>initializer 0 </a:t>
+              <a:t>Sigmoid </a:t>
             </a:r>
             <a:r>
               <a:rPr lang="ko-KR" altLang="en-US" sz="1600" dirty="0" smtClean="0">
@@ -12813,64 +12390,99 @@
                 <a:latin typeface="微软雅黑" panose="020B0503020204020204" pitchFamily="34" charset="-122"/>
                 <a:ea typeface="微软雅黑" panose="020B0503020204020204" pitchFamily="34" charset="-122"/>
               </a:rPr>
-              <a:t>에 가깝게 나온다</a:t>
-            </a:r>
-            <a:endParaRPr lang="en-US" altLang="ko-KR" sz="1600" dirty="0" smtClean="0">
-              <a:solidFill>
-                <a:schemeClr val="tx1">
-                  <a:lumMod val="50000"/>
-                  <a:lumOff val="50000"/>
-                </a:schemeClr>
-              </a:solidFill>
-              <a:latin typeface="微软雅黑" panose="020B0503020204020204" pitchFamily="34" charset="-122"/>
-              <a:ea typeface="微软雅黑" panose="020B0503020204020204" pitchFamily="34" charset="-122"/>
-            </a:endParaRPr>
-          </a:p>
-          <a:p>
-            <a:pPr>
-              <a:lnSpc>
-                <a:spcPct val="150000"/>
-              </a:lnSpc>
-            </a:pPr>
-            <a:r>
-              <a:rPr lang="en-US" altLang="ko-KR" sz="1600" dirty="0" err="1"/>
-              <a:t>Var</a:t>
-            </a:r>
-            <a:r>
-              <a:rPr lang="en-US" altLang="ko-KR" sz="1600" dirty="0"/>
-              <a:t>(W)=</a:t>
-            </a:r>
-            <a:r>
-              <a:rPr lang="en-US" altLang="ko-KR" sz="1600" dirty="0" smtClean="0"/>
-              <a:t>2/</a:t>
-            </a:r>
-            <a:r>
-              <a:rPr lang="en-US" altLang="ko-KR" sz="1600" dirty="0" err="1" smtClean="0"/>
-              <a:t>n</a:t>
-            </a:r>
-            <a:r>
-              <a:rPr lang="en-US" altLang="ko-KR" sz="900" dirty="0" err="1" smtClean="0"/>
-              <a:t>in</a:t>
-            </a:r>
-            <a:r>
-              <a:rPr lang="en-US" altLang="ko-KR" sz="1600" dirty="0" err="1" smtClean="0"/>
-              <a:t>+n</a:t>
-            </a:r>
-            <a:r>
-              <a:rPr lang="en-US" altLang="ko-KR" sz="900" dirty="0" err="1" smtClean="0"/>
-              <a:t>out</a:t>
-            </a:r>
-            <a:r>
-              <a:rPr lang="en-US" altLang="ko-KR" sz="900" dirty="0" smtClean="0"/>
+              <a:t>함수를 </a:t>
+            </a:r>
+            <a:r>
+              <a:rPr lang="en-US" altLang="ko-KR" sz="1600" dirty="0" err="1" smtClean="0">
+                <a:solidFill>
+                  <a:schemeClr val="tx1">
+                    <a:lumMod val="50000"/>
+                    <a:lumOff val="50000"/>
+                  </a:schemeClr>
+                </a:solidFill>
+                <a:latin typeface="微软雅黑" panose="020B0503020204020204" pitchFamily="34" charset="-122"/>
+                <a:ea typeface="微软雅黑" panose="020B0503020204020204" pitchFamily="34" charset="-122"/>
+              </a:rPr>
+              <a:t>Relu</a:t>
+            </a:r>
+            <a:r>
+              <a:rPr lang="en-US" altLang="ko-KR" sz="1600" dirty="0" smtClean="0">
+                <a:solidFill>
+                  <a:schemeClr val="tx1">
+                    <a:lumMod val="50000"/>
+                    <a:lumOff val="50000"/>
+                  </a:schemeClr>
+                </a:solidFill>
+                <a:latin typeface="微软雅黑" panose="020B0503020204020204" pitchFamily="34" charset="-122"/>
+                <a:ea typeface="微软雅黑" panose="020B0503020204020204" pitchFamily="34" charset="-122"/>
+              </a:rPr>
               <a:t> </a:t>
             </a:r>
             <a:r>
-              <a:rPr lang="en-US" altLang="ko-KR" sz="1600" dirty="0"/>
-              <a:t/>
-            </a:r>
-            <a:br>
-              <a:rPr lang="en-US" altLang="ko-KR" sz="1600" dirty="0"/>
-            </a:br>
+              <a:rPr lang="ko-KR" altLang="en-US" sz="1600" dirty="0" smtClean="0">
+                <a:solidFill>
+                  <a:schemeClr val="tx1">
+                    <a:lumMod val="50000"/>
+                    <a:lumOff val="50000"/>
+                  </a:schemeClr>
+                </a:solidFill>
+                <a:latin typeface="微软雅黑" panose="020B0503020204020204" pitchFamily="34" charset="-122"/>
+                <a:ea typeface="微软雅黑" panose="020B0503020204020204" pitchFamily="34" charset="-122"/>
+              </a:rPr>
+              <a:t>함수로 </a:t>
+            </a:r>
+            <a:r>
+              <a:rPr lang="ko-KR" altLang="en-US" sz="1600" dirty="0" err="1" smtClean="0">
+                <a:solidFill>
+                  <a:schemeClr val="tx1">
+                    <a:lumMod val="50000"/>
+                    <a:lumOff val="50000"/>
+                  </a:schemeClr>
+                </a:solidFill>
+                <a:latin typeface="微软雅黑" panose="020B0503020204020204" pitchFamily="34" charset="-122"/>
+                <a:ea typeface="微软雅黑" panose="020B0503020204020204" pitchFamily="34" charset="-122"/>
+              </a:rPr>
+              <a:t>변경했을때</a:t>
+            </a:r>
+            <a:r>
+              <a:rPr lang="ko-KR" altLang="en-US" sz="1600" dirty="0" smtClean="0">
+                <a:solidFill>
+                  <a:schemeClr val="tx1">
+                    <a:lumMod val="50000"/>
+                    <a:lumOff val="50000"/>
+                  </a:schemeClr>
+                </a:solidFill>
+                <a:latin typeface="微软雅黑" panose="020B0503020204020204" pitchFamily="34" charset="-122"/>
+                <a:ea typeface="微软雅黑" panose="020B0503020204020204" pitchFamily="34" charset="-122"/>
+              </a:rPr>
+              <a:t> 입니다</a:t>
+            </a:r>
+            <a:r>
+              <a:rPr lang="en-US" altLang="ko-KR" sz="1600" dirty="0" smtClean="0">
+                <a:solidFill>
+                  <a:schemeClr val="tx1">
+                    <a:lumMod val="50000"/>
+                    <a:lumOff val="50000"/>
+                  </a:schemeClr>
+                </a:solidFill>
+                <a:latin typeface="微软雅黑" panose="020B0503020204020204" pitchFamily="34" charset="-122"/>
+                <a:ea typeface="微软雅黑" panose="020B0503020204020204" pitchFamily="34" charset="-122"/>
+              </a:rPr>
+              <a:t>. ( 73% =&gt; 89% )</a:t>
+            </a:r>
+            <a:r>
+              <a:rPr lang="en-US" altLang="ko-KR" sz="1600" dirty="0" smtClean="0">
+                <a:solidFill>
+                  <a:schemeClr val="tx1">
+                    <a:lumMod val="50000"/>
+                    <a:lumOff val="50000"/>
+                  </a:schemeClr>
+                </a:solidFill>
+                <a:latin typeface="微软雅黑" panose="020B0503020204020204" pitchFamily="34" charset="-122"/>
+                <a:ea typeface="微软雅黑" panose="020B0503020204020204" pitchFamily="34" charset="-122"/>
+              </a:rPr>
+              <a:t> </a:t>
+            </a:r>
             <a:endParaRPr lang="en-US" altLang="ko-KR" sz="1600" dirty="0" smtClean="0">
               <a:solidFill>
                 <a:schemeClr val="tx1">
@@ -15729,14 +15341,6 @@
 <file path=ppt/slides/slide6.xml><?xml version="1.0" encoding="utf-8"?>
 <p:sld xmlns:a="http://schemas.openxmlformats.org/drawingml/2006/main" xmlns:r="http://schemas.openxmlformats.org/officeDocument/2006/relationships" xmlns:p="http://schemas.openxmlformats.org/presentationml/2006/main">
   <p:cSld>
-    <p:bg>
-      <p:bgPr>
-        <a:solidFill>
-          <a:schemeClr val="accent1"/>
-        </a:solidFill>
-        <a:effectLst/>
-      </p:bgPr>
-    </p:bg>
     <p:spTree>
       <p:nvGrpSpPr>
         <p:cNvPr id="1" name=""/>
@@ -15768,657 +15372,93 @@
           <a:p>
             <a:r>
               <a:rPr lang="en-US" altLang="zh-CN" dirty="0" smtClean="0"/>
-              <a:t>Code </a:t>
+              <a:t>Layer 1 </a:t>
             </a:r>
             <a:r>
               <a:rPr lang="ko-KR" altLang="en-US" dirty="0" smtClean="0"/>
-              <a:t>설명 </a:t>
+              <a:t>계층</a:t>
             </a:r>
             <a:r>
               <a:rPr lang="en-US" altLang="ko-KR" dirty="0" smtClean="0"/>
-              <a:t>( </a:t>
+              <a:t>, Sigmoid </a:t>
             </a:r>
             <a:r>
               <a:rPr lang="ko-KR" altLang="en-US" dirty="0" smtClean="0"/>
-              <a:t>초기 데이터 </a:t>
-            </a:r>
-            <a:r>
-              <a:rPr lang="en-US" altLang="ko-KR" dirty="0" smtClean="0"/>
-              <a:t>import &amp; </a:t>
-            </a:r>
-            <a:r>
-              <a:rPr lang="ko-KR" altLang="en-US" dirty="0" err="1" smtClean="0"/>
-              <a:t>노드</a:t>
-            </a:r>
-            <a:r>
-              <a:rPr lang="ko-KR" altLang="en-US" dirty="0" smtClean="0"/>
-              <a:t> 설정 </a:t>
-            </a:r>
-            <a:r>
-              <a:rPr lang="en-US" altLang="ko-KR" dirty="0" smtClean="0"/>
-              <a:t>)</a:t>
+              <a:t>이용</a:t>
             </a:r>
             <a:endParaRPr lang="zh-CN" altLang="en-US" dirty="0"/>
           </a:p>
         </p:txBody>
       </p:sp>
+      <p:pic>
+        <p:nvPicPr>
+          <p:cNvPr id="8" name="그림 7"/>
+          <p:cNvPicPr>
+            <a:picLocks noChangeAspect="1"/>
+          </p:cNvPicPr>
+          <p:nvPr/>
+        </p:nvPicPr>
+        <p:blipFill>
+          <a:blip r:embed="rId3">
+            <a:extLst>
+              <a:ext uri="{28A0092B-C50C-407E-A947-70E740481C1C}">
+                <a14:useLocalDpi xmlns:a14="http://schemas.microsoft.com/office/drawing/2010/main" val="0"/>
+              </a:ext>
+            </a:extLst>
+          </a:blip>
+          <a:stretch>
+            <a:fillRect/>
+          </a:stretch>
+        </p:blipFill>
+        <p:spPr>
+          <a:xfrm>
+            <a:off x="1613140" y="1527203"/>
+            <a:ext cx="7866931" cy="4763069"/>
+          </a:xfrm>
+          <a:prstGeom prst="rect">
+            <a:avLst/>
+          </a:prstGeom>
+        </p:spPr>
+      </p:pic>
       <p:sp>
         <p:nvSpPr>
-          <p:cNvPr id="4" name="직사각형 3"/>
-          <p:cNvSpPr/>
+          <p:cNvPr id="9" name="TextBox 8"/>
+          <p:cNvSpPr txBox="1"/>
           <p:nvPr/>
         </p:nvSpPr>
         <p:spPr>
           <a:xfrm>
-            <a:off x="948906" y="1582340"/>
-            <a:ext cx="10282686" cy="3970318"/>
+            <a:off x="8833740" y="2251495"/>
+            <a:ext cx="646331" cy="369332"/>
           </a:xfrm>
           <a:prstGeom prst="rect">
             <a:avLst/>
           </a:prstGeom>
-          <a:solidFill>
-            <a:schemeClr val="tx1">
-              <a:lumMod val="85000"/>
-              <a:lumOff val="15000"/>
-            </a:schemeClr>
-          </a:solidFill>
+          <a:noFill/>
         </p:spPr>
         <p:txBody>
-          <a:bodyPr wrap="square">
+          <a:bodyPr wrap="none" rtlCol="0">
             <a:spAutoFit/>
           </a:bodyPr>
           <a:lstStyle/>
           <a:p>
             <a:r>
-              <a:rPr lang="en-US" altLang="ko-KR" dirty="0">
-                <a:solidFill>
-                  <a:srgbClr val="D4D4D4"/>
-                </a:solidFill>
-                <a:latin typeface="Consolas" panose="020B0609020204030204" pitchFamily="49" charset="0"/>
-              </a:rPr>
-              <a:t/>
-            </a:r>
-            <a:br>
-              <a:rPr lang="en-US" altLang="ko-KR" dirty="0">
-                <a:solidFill>
-                  <a:srgbClr val="D4D4D4"/>
-                </a:solidFill>
-                <a:latin typeface="Consolas" panose="020B0609020204030204" pitchFamily="49" charset="0"/>
-              </a:rPr>
-            </a:br>
-            <a:endParaRPr lang="en-US" altLang="ko-KR" dirty="0" smtClean="0">
-              <a:solidFill>
-                <a:srgbClr val="D4D4D4"/>
-              </a:solidFill>
-              <a:latin typeface="Consolas" panose="020B0609020204030204" pitchFamily="49" charset="0"/>
-            </a:endParaRPr>
-          </a:p>
-          <a:p>
-            <a:endParaRPr lang="en-US" altLang="ko-KR" dirty="0">
-              <a:solidFill>
-                <a:srgbClr val="D4D4D4"/>
-              </a:solidFill>
-              <a:latin typeface="Consolas" panose="020B0609020204030204" pitchFamily="49" charset="0"/>
-            </a:endParaRPr>
-          </a:p>
-          <a:p>
-            <a:r>
-              <a:rPr lang="en-US" altLang="ko-KR" dirty="0" err="1" smtClean="0">
-                <a:solidFill>
-                  <a:srgbClr val="D4D4D4"/>
-                </a:solidFill>
-                <a:latin typeface="Consolas" panose="020B0609020204030204" pitchFamily="49" charset="0"/>
-              </a:rPr>
-              <a:t>mnist</a:t>
-            </a:r>
-            <a:r>
               <a:rPr lang="en-US" altLang="ko-KR" dirty="0" smtClean="0">
                 <a:solidFill>
-                  <a:srgbClr val="D4D4D4"/>
+                  <a:srgbClr val="FF0000"/>
                 </a:solidFill>
-                <a:latin typeface="Consolas" panose="020B0609020204030204" pitchFamily="49" charset="0"/>
               </a:rPr>
-              <a:t> </a:t>
-            </a:r>
-            <a:r>
-              <a:rPr lang="en-US" altLang="ko-KR" dirty="0">
-                <a:solidFill>
-                  <a:srgbClr val="D4D4D4"/>
-                </a:solidFill>
-                <a:latin typeface="Consolas" panose="020B0609020204030204" pitchFamily="49" charset="0"/>
-              </a:rPr>
-              <a:t>= </a:t>
-            </a:r>
-            <a:r>
-              <a:rPr lang="en-US" altLang="ko-KR" dirty="0" err="1">
-                <a:solidFill>
-                  <a:srgbClr val="D4D4D4"/>
-                </a:solidFill>
-                <a:latin typeface="Consolas" panose="020B0609020204030204" pitchFamily="49" charset="0"/>
-              </a:rPr>
-              <a:t>input_data.read_data_sets</a:t>
-            </a:r>
-            <a:r>
-              <a:rPr lang="en-US" altLang="ko-KR" dirty="0">
-                <a:solidFill>
-                  <a:srgbClr val="D4D4D4"/>
-                </a:solidFill>
-                <a:latin typeface="Consolas" panose="020B0609020204030204" pitchFamily="49" charset="0"/>
-              </a:rPr>
-              <a:t>(</a:t>
-            </a:r>
-            <a:r>
-              <a:rPr lang="en-US" altLang="ko-KR" dirty="0">
-                <a:solidFill>
-                  <a:srgbClr val="CE9178"/>
-                </a:solidFill>
-                <a:latin typeface="Consolas" panose="020B0609020204030204" pitchFamily="49" charset="0"/>
-              </a:rPr>
-              <a:t>"</a:t>
-            </a:r>
-            <a:r>
-              <a:rPr lang="en-US" altLang="ko-KR" dirty="0" err="1">
-                <a:solidFill>
-                  <a:srgbClr val="CE9178"/>
-                </a:solidFill>
-                <a:latin typeface="Consolas" panose="020B0609020204030204" pitchFamily="49" charset="0"/>
-              </a:rPr>
-              <a:t>MNIST_data</a:t>
-            </a:r>
-            <a:r>
-              <a:rPr lang="en-US" altLang="ko-KR" dirty="0">
-                <a:solidFill>
-                  <a:srgbClr val="CE9178"/>
-                </a:solidFill>
-                <a:latin typeface="Consolas" panose="020B0609020204030204" pitchFamily="49" charset="0"/>
-              </a:rPr>
-              <a:t>/"</a:t>
-            </a:r>
-            <a:r>
-              <a:rPr lang="en-US" altLang="ko-KR" dirty="0">
-                <a:solidFill>
-                  <a:srgbClr val="D4D4D4"/>
-                </a:solidFill>
-                <a:latin typeface="Consolas" panose="020B0609020204030204" pitchFamily="49" charset="0"/>
-              </a:rPr>
-              <a:t>, </a:t>
-            </a:r>
-            <a:r>
-              <a:rPr lang="en-US" altLang="ko-KR" dirty="0" err="1">
-                <a:solidFill>
-                  <a:srgbClr val="9CDCFE"/>
-                </a:solidFill>
-                <a:latin typeface="Consolas" panose="020B0609020204030204" pitchFamily="49" charset="0"/>
-              </a:rPr>
-              <a:t>one_hot</a:t>
-            </a:r>
-            <a:r>
-              <a:rPr lang="en-US" altLang="ko-KR" dirty="0">
-                <a:solidFill>
-                  <a:srgbClr val="D4D4D4"/>
-                </a:solidFill>
-                <a:latin typeface="Consolas" panose="020B0609020204030204" pitchFamily="49" charset="0"/>
-              </a:rPr>
-              <a:t>=</a:t>
-            </a:r>
-            <a:r>
-              <a:rPr lang="en-US" altLang="ko-KR" dirty="0">
-                <a:solidFill>
-                  <a:srgbClr val="569CD6"/>
-                </a:solidFill>
-                <a:latin typeface="Consolas" panose="020B0609020204030204" pitchFamily="49" charset="0"/>
-              </a:rPr>
-              <a:t>True</a:t>
-            </a:r>
-            <a:r>
-              <a:rPr lang="en-US" altLang="ko-KR" dirty="0">
-                <a:solidFill>
-                  <a:srgbClr val="D4D4D4"/>
-                </a:solidFill>
-                <a:latin typeface="Consolas" panose="020B0609020204030204" pitchFamily="49" charset="0"/>
-              </a:rPr>
-              <a:t>)</a:t>
-            </a:r>
-          </a:p>
-          <a:p>
-            <a:r>
-              <a:rPr lang="en-US" altLang="ko-KR" dirty="0" err="1">
-                <a:solidFill>
-                  <a:srgbClr val="D4D4D4"/>
-                </a:solidFill>
-                <a:latin typeface="Consolas" panose="020B0609020204030204" pitchFamily="49" charset="0"/>
-              </a:rPr>
-              <a:t>learning_rate</a:t>
-            </a:r>
-            <a:r>
-              <a:rPr lang="en-US" altLang="ko-KR" dirty="0">
-                <a:solidFill>
-                  <a:srgbClr val="D4D4D4"/>
-                </a:solidFill>
-                <a:latin typeface="Consolas" panose="020B0609020204030204" pitchFamily="49" charset="0"/>
-              </a:rPr>
-              <a:t> = </a:t>
-            </a:r>
-            <a:r>
-              <a:rPr lang="en-US" altLang="ko-KR" dirty="0">
-                <a:solidFill>
-                  <a:srgbClr val="B5CEA8"/>
-                </a:solidFill>
-                <a:latin typeface="Consolas" panose="020B0609020204030204" pitchFamily="49" charset="0"/>
-              </a:rPr>
-              <a:t>0.001</a:t>
-            </a:r>
-            <a:endParaRPr lang="en-US" altLang="ko-KR" dirty="0">
-              <a:solidFill>
-                <a:srgbClr val="D4D4D4"/>
-              </a:solidFill>
-              <a:latin typeface="Consolas" panose="020B0609020204030204" pitchFamily="49" charset="0"/>
-            </a:endParaRPr>
-          </a:p>
-          <a:p>
-            <a:r>
-              <a:rPr lang="en-US" altLang="ko-KR" dirty="0" err="1">
-                <a:solidFill>
-                  <a:srgbClr val="D4D4D4"/>
-                </a:solidFill>
-                <a:latin typeface="Consolas" panose="020B0609020204030204" pitchFamily="49" charset="0"/>
-              </a:rPr>
-              <a:t>training_epochs</a:t>
-            </a:r>
-            <a:r>
-              <a:rPr lang="en-US" altLang="ko-KR" dirty="0">
-                <a:solidFill>
-                  <a:srgbClr val="D4D4D4"/>
-                </a:solidFill>
-                <a:latin typeface="Consolas" panose="020B0609020204030204" pitchFamily="49" charset="0"/>
-              </a:rPr>
-              <a:t> = </a:t>
-            </a:r>
-            <a:r>
-              <a:rPr lang="en-US" altLang="ko-KR" dirty="0">
-                <a:solidFill>
-                  <a:srgbClr val="B5CEA8"/>
-                </a:solidFill>
-                <a:latin typeface="Consolas" panose="020B0609020204030204" pitchFamily="49" charset="0"/>
-              </a:rPr>
-              <a:t>15</a:t>
-            </a:r>
-            <a:endParaRPr lang="en-US" altLang="ko-KR" dirty="0">
-              <a:solidFill>
-                <a:srgbClr val="D4D4D4"/>
-              </a:solidFill>
-              <a:latin typeface="Consolas" panose="020B0609020204030204" pitchFamily="49" charset="0"/>
-            </a:endParaRPr>
-          </a:p>
-          <a:p>
-            <a:r>
-              <a:rPr lang="en-US" altLang="ko-KR" dirty="0" err="1">
-                <a:solidFill>
-                  <a:srgbClr val="D4D4D4"/>
-                </a:solidFill>
-                <a:latin typeface="Consolas" panose="020B0609020204030204" pitchFamily="49" charset="0"/>
-              </a:rPr>
-              <a:t>batch_size</a:t>
-            </a:r>
-            <a:r>
-              <a:rPr lang="en-US" altLang="ko-KR" dirty="0">
-                <a:solidFill>
-                  <a:srgbClr val="D4D4D4"/>
-                </a:solidFill>
-                <a:latin typeface="Consolas" panose="020B0609020204030204" pitchFamily="49" charset="0"/>
-              </a:rPr>
-              <a:t> = </a:t>
-            </a:r>
-            <a:r>
-              <a:rPr lang="en-US" altLang="ko-KR" dirty="0">
-                <a:solidFill>
-                  <a:srgbClr val="B5CEA8"/>
-                </a:solidFill>
-                <a:latin typeface="Consolas" panose="020B0609020204030204" pitchFamily="49" charset="0"/>
-              </a:rPr>
-              <a:t>100</a:t>
-            </a:r>
-            <a:endParaRPr lang="en-US" altLang="ko-KR" dirty="0">
-              <a:solidFill>
-                <a:srgbClr val="D4D4D4"/>
-              </a:solidFill>
-              <a:latin typeface="Consolas" panose="020B0609020204030204" pitchFamily="49" charset="0"/>
-            </a:endParaRPr>
-          </a:p>
-          <a:p>
-            <a:r>
-              <a:rPr lang="en-US" altLang="ko-KR" dirty="0" err="1">
-                <a:solidFill>
-                  <a:srgbClr val="D4D4D4"/>
-                </a:solidFill>
-                <a:latin typeface="Consolas" panose="020B0609020204030204" pitchFamily="49" charset="0"/>
-              </a:rPr>
-              <a:t>total_batch</a:t>
-            </a:r>
-            <a:r>
-              <a:rPr lang="en-US" altLang="ko-KR" dirty="0">
-                <a:solidFill>
-                  <a:srgbClr val="D4D4D4"/>
-                </a:solidFill>
-                <a:latin typeface="Consolas" panose="020B0609020204030204" pitchFamily="49" charset="0"/>
-              </a:rPr>
-              <a:t> = </a:t>
-            </a:r>
-            <a:r>
-              <a:rPr lang="en-US" altLang="ko-KR" dirty="0" err="1">
-                <a:solidFill>
-                  <a:srgbClr val="4EC9B0"/>
-                </a:solidFill>
-                <a:latin typeface="Consolas" panose="020B0609020204030204" pitchFamily="49" charset="0"/>
-              </a:rPr>
-              <a:t>int</a:t>
-            </a:r>
-            <a:r>
-              <a:rPr lang="en-US" altLang="ko-KR" dirty="0">
-                <a:solidFill>
-                  <a:srgbClr val="D4D4D4"/>
-                </a:solidFill>
-                <a:latin typeface="Consolas" panose="020B0609020204030204" pitchFamily="49" charset="0"/>
-              </a:rPr>
-              <a:t>(</a:t>
-            </a:r>
-            <a:r>
-              <a:rPr lang="en-US" altLang="ko-KR" dirty="0" err="1">
-                <a:solidFill>
-                  <a:srgbClr val="D4D4D4"/>
-                </a:solidFill>
-                <a:latin typeface="Consolas" panose="020B0609020204030204" pitchFamily="49" charset="0"/>
-              </a:rPr>
-              <a:t>mnist.train.num_examples</a:t>
-            </a:r>
-            <a:r>
-              <a:rPr lang="en-US" altLang="ko-KR" dirty="0">
-                <a:solidFill>
-                  <a:srgbClr val="D4D4D4"/>
-                </a:solidFill>
-                <a:latin typeface="Consolas" panose="020B0609020204030204" pitchFamily="49" charset="0"/>
-              </a:rPr>
-              <a:t> / </a:t>
-            </a:r>
-            <a:r>
-              <a:rPr lang="en-US" altLang="ko-KR" dirty="0" err="1">
-                <a:solidFill>
-                  <a:srgbClr val="D4D4D4"/>
-                </a:solidFill>
-                <a:latin typeface="Consolas" panose="020B0609020204030204" pitchFamily="49" charset="0"/>
-              </a:rPr>
-              <a:t>batch_size</a:t>
-            </a:r>
-            <a:r>
-              <a:rPr lang="en-US" altLang="ko-KR" dirty="0">
-                <a:solidFill>
-                  <a:srgbClr val="D4D4D4"/>
-                </a:solidFill>
-                <a:latin typeface="Consolas" panose="020B0609020204030204" pitchFamily="49" charset="0"/>
-              </a:rPr>
-              <a:t>)</a:t>
-            </a:r>
-          </a:p>
-          <a:p>
-            <a:r>
-              <a:rPr lang="en-US" altLang="ko-KR" dirty="0">
-                <a:solidFill>
-                  <a:srgbClr val="D4D4D4"/>
-                </a:solidFill>
-                <a:latin typeface="Consolas" panose="020B0609020204030204" pitchFamily="49" charset="0"/>
-              </a:rPr>
-              <a:t/>
-            </a:r>
-            <a:br>
-              <a:rPr lang="en-US" altLang="ko-KR" dirty="0">
-                <a:solidFill>
-                  <a:srgbClr val="D4D4D4"/>
-                </a:solidFill>
-                <a:latin typeface="Consolas" panose="020B0609020204030204" pitchFamily="49" charset="0"/>
-              </a:rPr>
-            </a:br>
-            <a:r>
-              <a:rPr lang="en-US" altLang="ko-KR" dirty="0">
-                <a:solidFill>
-                  <a:srgbClr val="D4D4D4"/>
-                </a:solidFill>
-                <a:latin typeface="Consolas" panose="020B0609020204030204" pitchFamily="49" charset="0"/>
-              </a:rPr>
-              <a:t>X = </a:t>
-            </a:r>
-            <a:r>
-              <a:rPr lang="en-US" altLang="ko-KR" dirty="0" err="1">
-                <a:solidFill>
-                  <a:srgbClr val="D4D4D4"/>
-                </a:solidFill>
-                <a:latin typeface="Consolas" panose="020B0609020204030204" pitchFamily="49" charset="0"/>
-              </a:rPr>
-              <a:t>tf.placeholder</a:t>
-            </a:r>
-            <a:r>
-              <a:rPr lang="en-US" altLang="ko-KR" dirty="0">
-                <a:solidFill>
-                  <a:srgbClr val="D4D4D4"/>
-                </a:solidFill>
-                <a:latin typeface="Consolas" panose="020B0609020204030204" pitchFamily="49" charset="0"/>
-              </a:rPr>
-              <a:t>(tf.float32, [</a:t>
-            </a:r>
-            <a:r>
-              <a:rPr lang="en-US" altLang="ko-KR" dirty="0">
-                <a:solidFill>
-                  <a:srgbClr val="569CD6"/>
-                </a:solidFill>
-                <a:latin typeface="Consolas" panose="020B0609020204030204" pitchFamily="49" charset="0"/>
-              </a:rPr>
-              <a:t>None</a:t>
-            </a:r>
-            <a:r>
-              <a:rPr lang="en-US" altLang="ko-KR" dirty="0">
-                <a:solidFill>
-                  <a:srgbClr val="D4D4D4"/>
-                </a:solidFill>
-                <a:latin typeface="Consolas" panose="020B0609020204030204" pitchFamily="49" charset="0"/>
-              </a:rPr>
-              <a:t>, </a:t>
-            </a:r>
-            <a:r>
-              <a:rPr lang="en-US" altLang="ko-KR" dirty="0">
-                <a:solidFill>
-                  <a:srgbClr val="B5CEA8"/>
-                </a:solidFill>
-                <a:latin typeface="Consolas" panose="020B0609020204030204" pitchFamily="49" charset="0"/>
-              </a:rPr>
-              <a:t>784</a:t>
-            </a:r>
-            <a:r>
-              <a:rPr lang="en-US" altLang="ko-KR" dirty="0">
-                <a:solidFill>
-                  <a:srgbClr val="D4D4D4"/>
-                </a:solidFill>
-                <a:latin typeface="Consolas" panose="020B0609020204030204" pitchFamily="49" charset="0"/>
-              </a:rPr>
-              <a:t>]) </a:t>
-            </a:r>
-            <a:r>
-              <a:rPr lang="en-US" altLang="ko-KR" dirty="0">
-                <a:solidFill>
-                  <a:srgbClr val="6A9955"/>
-                </a:solidFill>
-                <a:latin typeface="Consolas" panose="020B0609020204030204" pitchFamily="49" charset="0"/>
-              </a:rPr>
-              <a:t># </a:t>
-            </a:r>
-            <a:r>
-              <a:rPr lang="ko-KR" altLang="en-US" dirty="0">
-                <a:solidFill>
-                  <a:srgbClr val="6A9955"/>
-                </a:solidFill>
-                <a:latin typeface="Consolas" panose="020B0609020204030204" pitchFamily="49" charset="0"/>
-              </a:rPr>
-              <a:t>초기 </a:t>
-            </a:r>
-            <a:r>
-              <a:rPr lang="ko-KR" altLang="en-US" dirty="0" err="1">
-                <a:solidFill>
-                  <a:srgbClr val="6A9955"/>
-                </a:solidFill>
-                <a:latin typeface="Consolas" panose="020B0609020204030204" pitchFamily="49" charset="0"/>
-              </a:rPr>
-              <a:t>입력값</a:t>
-            </a:r>
-            <a:endParaRPr lang="ko-KR" altLang="en-US" dirty="0">
-              <a:solidFill>
-                <a:srgbClr val="D4D4D4"/>
-              </a:solidFill>
-              <a:latin typeface="Consolas" panose="020B0609020204030204" pitchFamily="49" charset="0"/>
-            </a:endParaRPr>
-          </a:p>
-          <a:p>
-            <a:r>
-              <a:rPr lang="en-US" altLang="ko-KR" dirty="0">
-                <a:solidFill>
-                  <a:srgbClr val="D4D4D4"/>
-                </a:solidFill>
-                <a:latin typeface="Consolas" panose="020B0609020204030204" pitchFamily="49" charset="0"/>
-              </a:rPr>
-              <a:t>Y = </a:t>
-            </a:r>
-            <a:r>
-              <a:rPr lang="en-US" altLang="ko-KR" dirty="0" err="1">
-                <a:solidFill>
-                  <a:srgbClr val="D4D4D4"/>
-                </a:solidFill>
-                <a:latin typeface="Consolas" panose="020B0609020204030204" pitchFamily="49" charset="0"/>
-              </a:rPr>
-              <a:t>tf.placeholder</a:t>
-            </a:r>
-            <a:r>
-              <a:rPr lang="en-US" altLang="ko-KR" dirty="0">
-                <a:solidFill>
-                  <a:srgbClr val="D4D4D4"/>
-                </a:solidFill>
-                <a:latin typeface="Consolas" panose="020B0609020204030204" pitchFamily="49" charset="0"/>
-              </a:rPr>
-              <a:t>(tf.float32, [</a:t>
-            </a:r>
-            <a:r>
-              <a:rPr lang="en-US" altLang="ko-KR" dirty="0">
-                <a:solidFill>
-                  <a:srgbClr val="569CD6"/>
-                </a:solidFill>
-                <a:latin typeface="Consolas" panose="020B0609020204030204" pitchFamily="49" charset="0"/>
-              </a:rPr>
-              <a:t>None</a:t>
-            </a:r>
-            <a:r>
-              <a:rPr lang="en-US" altLang="ko-KR" dirty="0">
-                <a:solidFill>
-                  <a:srgbClr val="D4D4D4"/>
-                </a:solidFill>
-                <a:latin typeface="Consolas" panose="020B0609020204030204" pitchFamily="49" charset="0"/>
-              </a:rPr>
-              <a:t>, </a:t>
-            </a:r>
-            <a:r>
-              <a:rPr lang="en-US" altLang="ko-KR" dirty="0">
-                <a:solidFill>
-                  <a:srgbClr val="B5CEA8"/>
-                </a:solidFill>
-                <a:latin typeface="Consolas" panose="020B0609020204030204" pitchFamily="49" charset="0"/>
-              </a:rPr>
-              <a:t>10</a:t>
-            </a:r>
-            <a:r>
-              <a:rPr lang="en-US" altLang="ko-KR" dirty="0">
-                <a:solidFill>
-                  <a:srgbClr val="D4D4D4"/>
-                </a:solidFill>
-                <a:latin typeface="Consolas" panose="020B0609020204030204" pitchFamily="49" charset="0"/>
-              </a:rPr>
-              <a:t>]) </a:t>
-            </a:r>
-            <a:r>
-              <a:rPr lang="en-US" altLang="ko-KR" dirty="0">
-                <a:solidFill>
-                  <a:srgbClr val="6A9955"/>
-                </a:solidFill>
-                <a:latin typeface="Consolas" panose="020B0609020204030204" pitchFamily="49" charset="0"/>
-              </a:rPr>
-              <a:t># </a:t>
-            </a:r>
-            <a:r>
-              <a:rPr lang="ko-KR" altLang="en-US" dirty="0">
-                <a:solidFill>
-                  <a:srgbClr val="6A9955"/>
-                </a:solidFill>
-                <a:latin typeface="Consolas" panose="020B0609020204030204" pitchFamily="49" charset="0"/>
-              </a:rPr>
-              <a:t>판단 </a:t>
-            </a:r>
-            <a:r>
-              <a:rPr lang="ko-KR" altLang="en-US" dirty="0" err="1">
-                <a:solidFill>
-                  <a:srgbClr val="6A9955"/>
-                </a:solidFill>
-                <a:latin typeface="Consolas" panose="020B0609020204030204" pitchFamily="49" charset="0"/>
-              </a:rPr>
-              <a:t>해야할</a:t>
-            </a:r>
-            <a:r>
-              <a:rPr lang="ko-KR" altLang="en-US" dirty="0">
-                <a:solidFill>
-                  <a:srgbClr val="6A9955"/>
-                </a:solidFill>
-                <a:latin typeface="Consolas" panose="020B0609020204030204" pitchFamily="49" charset="0"/>
-              </a:rPr>
-              <a:t> 결과 </a:t>
-            </a:r>
-            <a:r>
-              <a:rPr lang="ko-KR" altLang="en-US" dirty="0" smtClean="0">
-                <a:solidFill>
-                  <a:srgbClr val="6A9955"/>
-                </a:solidFill>
-                <a:latin typeface="Consolas" panose="020B0609020204030204" pitchFamily="49" charset="0"/>
-              </a:rPr>
-              <a:t>개수</a:t>
-            </a:r>
-            <a:endParaRPr lang="en-US" altLang="ko-KR" dirty="0" smtClean="0">
-              <a:solidFill>
-                <a:srgbClr val="6A9955"/>
-              </a:solidFill>
-              <a:latin typeface="Consolas" panose="020B0609020204030204" pitchFamily="49" charset="0"/>
-            </a:endParaRPr>
-          </a:p>
-          <a:p>
-            <a:endParaRPr lang="en-US" altLang="ko-KR" b="0" dirty="0">
-              <a:solidFill>
-                <a:srgbClr val="6A9955"/>
-              </a:solidFill>
-              <a:effectLst/>
-              <a:latin typeface="Consolas" panose="020B0609020204030204" pitchFamily="49" charset="0"/>
-            </a:endParaRPr>
-          </a:p>
-          <a:p>
-            <a:endParaRPr lang="en-US" altLang="ko-KR" dirty="0" smtClean="0">
-              <a:solidFill>
-                <a:srgbClr val="6A9955"/>
-              </a:solidFill>
-              <a:latin typeface="Consolas" panose="020B0609020204030204" pitchFamily="49" charset="0"/>
-            </a:endParaRPr>
-          </a:p>
-          <a:p>
-            <a:endParaRPr lang="en-US" altLang="ko-KR" b="0" dirty="0">
-              <a:solidFill>
-                <a:srgbClr val="6A9955"/>
-              </a:solidFill>
-              <a:effectLst/>
-              <a:latin typeface="Consolas" panose="020B0609020204030204" pitchFamily="49" charset="0"/>
-            </a:endParaRPr>
+              <a:t>73%</a:t>
+            </a:r>
           </a:p>
         </p:txBody>
       </p:sp>
     </p:spTree>
+    <p:extLst>
+      <p:ext uri="{BB962C8B-B14F-4D97-AF65-F5344CB8AC3E}">
+        <p14:creationId xmlns:p14="http://schemas.microsoft.com/office/powerpoint/2010/main" val="3484694153"/>
+      </p:ext>
+    </p:extLst>
   </p:cSld>
   <p:clrMapOvr>
     <a:masterClrMapping/>
@@ -16478,831 +15518,88 @@
           <a:lstStyle/>
           <a:p>
             <a:r>
-              <a:rPr lang="en-US" altLang="zh-CN" dirty="0"/>
-              <a:t>Code </a:t>
+              <a:rPr lang="en-US" altLang="zh-CN" err="1" smtClean="0"/>
+              <a:t>Relu</a:t>
+            </a:r>
+            <a:r>
+              <a:rPr lang="en-US" altLang="zh-CN" dirty="0" smtClean="0"/>
+              <a:t> </a:t>
             </a:r>
             <a:r>
               <a:rPr lang="ko-KR" altLang="en-US" dirty="0" smtClean="0"/>
-              <a:t>설명</a:t>
-            </a:r>
-            <a:r>
-              <a:rPr lang="en-US" altLang="ko-KR" dirty="0" smtClean="0"/>
-              <a:t>( layer </a:t>
-            </a:r>
-            <a:r>
-              <a:rPr lang="ko-KR" altLang="en-US" dirty="0" smtClean="0"/>
-              <a:t>설정 </a:t>
-            </a:r>
-            <a:r>
-              <a:rPr lang="en-US" altLang="ko-KR" dirty="0" smtClean="0"/>
-              <a:t>) </a:t>
+              <a:t>이용</a:t>
             </a:r>
             <a:endParaRPr lang="zh-CN" altLang="en-US" dirty="0"/>
           </a:p>
         </p:txBody>
       </p:sp>
+      <p:pic>
+        <p:nvPicPr>
+          <p:cNvPr id="3" name="그림 2"/>
+          <p:cNvPicPr>
+            <a:picLocks noChangeAspect="1"/>
+          </p:cNvPicPr>
+          <p:nvPr/>
+        </p:nvPicPr>
+        <p:blipFill>
+          <a:blip r:embed="rId3">
+            <a:extLst>
+              <a:ext uri="{28A0092B-C50C-407E-A947-70E740481C1C}">
+                <a14:useLocalDpi xmlns:a14="http://schemas.microsoft.com/office/drawing/2010/main" val="0"/>
+              </a:ext>
+            </a:extLst>
+          </a:blip>
+          <a:stretch>
+            <a:fillRect/>
+          </a:stretch>
+        </p:blipFill>
+        <p:spPr>
+          <a:xfrm>
+            <a:off x="1621946" y="1527203"/>
+            <a:ext cx="7858125" cy="4757738"/>
+          </a:xfrm>
+          <a:prstGeom prst="rect">
+            <a:avLst/>
+          </a:prstGeom>
+        </p:spPr>
+      </p:pic>
       <p:sp>
         <p:nvSpPr>
-          <p:cNvPr id="3" name="직사각형 2"/>
-          <p:cNvSpPr/>
+          <p:cNvPr id="7" name="TextBox 6"/>
+          <p:cNvSpPr txBox="1"/>
           <p:nvPr/>
         </p:nvSpPr>
         <p:spPr>
           <a:xfrm>
-            <a:off x="1052423" y="1490833"/>
-            <a:ext cx="10222301" cy="4524315"/>
+            <a:off x="8833740" y="2251495"/>
+            <a:ext cx="646331" cy="369332"/>
           </a:xfrm>
           <a:prstGeom prst="rect">
             <a:avLst/>
           </a:prstGeom>
-          <a:solidFill>
-            <a:schemeClr val="tx1">
-              <a:lumMod val="85000"/>
-              <a:lumOff val="15000"/>
-            </a:schemeClr>
-          </a:solidFill>
+          <a:noFill/>
         </p:spPr>
         <p:txBody>
-          <a:bodyPr wrap="square">
+          <a:bodyPr wrap="none" rtlCol="0">
             <a:spAutoFit/>
           </a:bodyPr>
           <a:lstStyle/>
           <a:p>
-            <a:endParaRPr lang="en-US" altLang="ko-KR" dirty="0" smtClean="0">
-              <a:solidFill>
-                <a:srgbClr val="D4D4D4"/>
-              </a:solidFill>
-              <a:latin typeface="Consolas" panose="020B0609020204030204" pitchFamily="49" charset="0"/>
-            </a:endParaRPr>
-          </a:p>
-          <a:p>
-            <a:endParaRPr lang="en-US" altLang="ko-KR" dirty="0" smtClean="0">
-              <a:solidFill>
-                <a:srgbClr val="D4D4D4"/>
-              </a:solidFill>
-              <a:latin typeface="Consolas" panose="020B0609020204030204" pitchFamily="49" charset="0"/>
-            </a:endParaRPr>
-          </a:p>
-          <a:p>
-            <a:endParaRPr lang="en-US" altLang="ko-KR" dirty="0">
-              <a:solidFill>
-                <a:srgbClr val="D4D4D4"/>
-              </a:solidFill>
-              <a:latin typeface="Consolas" panose="020B0609020204030204" pitchFamily="49" charset="0"/>
-            </a:endParaRPr>
-          </a:p>
-          <a:p>
             <a:r>
               <a:rPr lang="en-US" altLang="ko-KR" dirty="0" smtClean="0">
                 <a:solidFill>
-                  <a:srgbClr val="D4D4D4"/>
+                  <a:srgbClr val="FF0000"/>
                 </a:solidFill>
-                <a:latin typeface="Consolas" panose="020B0609020204030204" pitchFamily="49" charset="0"/>
               </a:rPr>
-              <a:t>W1 </a:t>
-            </a:r>
-            <a:r>
-              <a:rPr lang="en-US" altLang="ko-KR" dirty="0">
-                <a:solidFill>
-                  <a:srgbClr val="D4D4D4"/>
-                </a:solidFill>
-                <a:latin typeface="Consolas" panose="020B0609020204030204" pitchFamily="49" charset="0"/>
-              </a:rPr>
-              <a:t>= </a:t>
-            </a:r>
-            <a:r>
-              <a:rPr lang="en-US" altLang="ko-KR" dirty="0" err="1">
-                <a:solidFill>
-                  <a:srgbClr val="D4D4D4"/>
-                </a:solidFill>
-                <a:latin typeface="Consolas" panose="020B0609020204030204" pitchFamily="49" charset="0"/>
-              </a:rPr>
-              <a:t>tf.get_variable</a:t>
-            </a:r>
-            <a:r>
-              <a:rPr lang="en-US" altLang="ko-KR" dirty="0">
-                <a:solidFill>
-                  <a:srgbClr val="D4D4D4"/>
-                </a:solidFill>
-                <a:latin typeface="Consolas" panose="020B0609020204030204" pitchFamily="49" charset="0"/>
-              </a:rPr>
-              <a:t>(</a:t>
-            </a:r>
-            <a:r>
-              <a:rPr lang="en-US" altLang="ko-KR" dirty="0">
-                <a:solidFill>
-                  <a:srgbClr val="CE9178"/>
-                </a:solidFill>
-                <a:latin typeface="Consolas" panose="020B0609020204030204" pitchFamily="49" charset="0"/>
-              </a:rPr>
-              <a:t>"W1"</a:t>
-            </a:r>
-            <a:r>
-              <a:rPr lang="en-US" altLang="ko-KR" dirty="0">
-                <a:solidFill>
-                  <a:srgbClr val="D4D4D4"/>
-                </a:solidFill>
-                <a:latin typeface="Consolas" panose="020B0609020204030204" pitchFamily="49" charset="0"/>
-              </a:rPr>
-              <a:t>, </a:t>
-            </a:r>
-            <a:r>
-              <a:rPr lang="en-US" altLang="ko-KR" dirty="0">
-                <a:solidFill>
-                  <a:srgbClr val="9CDCFE"/>
-                </a:solidFill>
-                <a:latin typeface="Consolas" panose="020B0609020204030204" pitchFamily="49" charset="0"/>
-              </a:rPr>
-              <a:t>shape</a:t>
-            </a:r>
-            <a:r>
-              <a:rPr lang="en-US" altLang="ko-KR" dirty="0">
-                <a:solidFill>
-                  <a:srgbClr val="D4D4D4"/>
-                </a:solidFill>
-                <a:latin typeface="Consolas" panose="020B0609020204030204" pitchFamily="49" charset="0"/>
-              </a:rPr>
-              <a:t>=[</a:t>
-            </a:r>
-            <a:r>
-              <a:rPr lang="en-US" altLang="ko-KR" dirty="0">
-                <a:solidFill>
-                  <a:srgbClr val="B5CEA8"/>
-                </a:solidFill>
-                <a:latin typeface="Consolas" panose="020B0609020204030204" pitchFamily="49" charset="0"/>
-              </a:rPr>
-              <a:t>784</a:t>
-            </a:r>
-            <a:r>
-              <a:rPr lang="en-US" altLang="ko-KR" dirty="0">
-                <a:solidFill>
-                  <a:srgbClr val="D4D4D4"/>
-                </a:solidFill>
-                <a:latin typeface="Consolas" panose="020B0609020204030204" pitchFamily="49" charset="0"/>
-              </a:rPr>
-              <a:t>, </a:t>
-            </a:r>
-            <a:r>
-              <a:rPr lang="en-US" altLang="ko-KR" dirty="0">
-                <a:solidFill>
-                  <a:srgbClr val="B5CEA8"/>
-                </a:solidFill>
-                <a:latin typeface="Consolas" panose="020B0609020204030204" pitchFamily="49" charset="0"/>
-              </a:rPr>
-              <a:t>512</a:t>
-            </a:r>
-            <a:r>
-              <a:rPr lang="en-US" altLang="ko-KR" dirty="0">
-                <a:solidFill>
-                  <a:srgbClr val="D4D4D4"/>
-                </a:solidFill>
-                <a:latin typeface="Consolas" panose="020B0609020204030204" pitchFamily="49" charset="0"/>
-              </a:rPr>
-              <a:t>], </a:t>
-            </a:r>
-            <a:r>
-              <a:rPr lang="en-US" altLang="ko-KR" dirty="0" smtClean="0">
-                <a:solidFill>
-                  <a:srgbClr val="9CDCFE"/>
-                </a:solidFill>
-                <a:latin typeface="Consolas" panose="020B0609020204030204" pitchFamily="49" charset="0"/>
-              </a:rPr>
-              <a:t>initializer</a:t>
-            </a:r>
-            <a:r>
-              <a:rPr lang="en-US" altLang="ko-KR" dirty="0" smtClean="0">
-                <a:solidFill>
-                  <a:srgbClr val="D4D4D4"/>
-                </a:solidFill>
-                <a:latin typeface="Consolas" panose="020B0609020204030204" pitchFamily="49" charset="0"/>
-              </a:rPr>
-              <a:t>=</a:t>
-            </a:r>
-            <a:r>
-              <a:rPr lang="en-US" altLang="ko-KR" dirty="0" err="1" smtClean="0">
-                <a:solidFill>
-                  <a:srgbClr val="D4D4D4"/>
-                </a:solidFill>
-                <a:latin typeface="Consolas" panose="020B0609020204030204" pitchFamily="49" charset="0"/>
-              </a:rPr>
-              <a:t>tf.contrib.layers.xavier_initializer</a:t>
-            </a:r>
-            <a:r>
-              <a:rPr lang="en-US" altLang="ko-KR" dirty="0" smtClean="0">
-                <a:solidFill>
-                  <a:srgbClr val="D4D4D4"/>
-                </a:solidFill>
-                <a:latin typeface="Consolas" panose="020B0609020204030204" pitchFamily="49" charset="0"/>
-              </a:rPr>
-              <a:t>())</a:t>
-            </a:r>
-          </a:p>
-          <a:p>
-            <a:r>
-              <a:rPr lang="en-US" altLang="ko-KR" dirty="0">
-                <a:solidFill>
-                  <a:srgbClr val="6A9955"/>
-                </a:solidFill>
-                <a:latin typeface="Consolas" panose="020B0609020204030204" pitchFamily="49" charset="0"/>
-              </a:rPr>
-              <a:t># 784</a:t>
-            </a:r>
-            <a:r>
-              <a:rPr lang="ko-KR" altLang="en-US" dirty="0">
-                <a:solidFill>
-                  <a:srgbClr val="6A9955"/>
-                </a:solidFill>
-                <a:latin typeface="Consolas" panose="020B0609020204030204" pitchFamily="49" charset="0"/>
-              </a:rPr>
-              <a:t>개 인풋이 들어가고 </a:t>
-            </a:r>
-            <a:r>
-              <a:rPr lang="en-US" altLang="ko-KR" dirty="0">
-                <a:solidFill>
-                  <a:srgbClr val="6A9955"/>
-                </a:solidFill>
-                <a:latin typeface="Consolas" panose="020B0609020204030204" pitchFamily="49" charset="0"/>
-              </a:rPr>
-              <a:t>512</a:t>
-            </a:r>
-            <a:r>
-              <a:rPr lang="ko-KR" altLang="en-US" dirty="0">
-                <a:solidFill>
-                  <a:srgbClr val="6A9955"/>
-                </a:solidFill>
-                <a:latin typeface="Consolas" panose="020B0609020204030204" pitchFamily="49" charset="0"/>
-              </a:rPr>
-              <a:t>개의 </a:t>
-            </a:r>
-            <a:r>
-              <a:rPr lang="ko-KR" altLang="en-US" dirty="0" smtClean="0">
-                <a:solidFill>
-                  <a:srgbClr val="6A9955"/>
-                </a:solidFill>
-                <a:latin typeface="Consolas" panose="020B0609020204030204" pitchFamily="49" charset="0"/>
-              </a:rPr>
-              <a:t>아웃풋</a:t>
-            </a:r>
-            <a:endParaRPr lang="en-US" altLang="ko-KR" dirty="0">
-              <a:solidFill>
-                <a:srgbClr val="D4D4D4"/>
-              </a:solidFill>
-              <a:latin typeface="Consolas" panose="020B0609020204030204" pitchFamily="49" charset="0"/>
-            </a:endParaRPr>
-          </a:p>
-          <a:p>
-            <a:r>
-              <a:rPr lang="en-US" altLang="ko-KR" dirty="0">
-                <a:solidFill>
-                  <a:srgbClr val="6A9955"/>
-                </a:solidFill>
-                <a:latin typeface="Consolas" panose="020B0609020204030204" pitchFamily="49" charset="0"/>
-              </a:rPr>
-              <a:t># </a:t>
-            </a:r>
-            <a:r>
-              <a:rPr lang="ko-KR" altLang="en-US" dirty="0">
-                <a:solidFill>
-                  <a:srgbClr val="6A9955"/>
-                </a:solidFill>
-                <a:latin typeface="Consolas" panose="020B0609020204030204" pitchFamily="49" charset="0"/>
-              </a:rPr>
-              <a:t>초기화를 </a:t>
-            </a:r>
-            <a:r>
-              <a:rPr lang="en-US" altLang="ko-KR" dirty="0" err="1">
-                <a:solidFill>
-                  <a:srgbClr val="6A9955"/>
-                </a:solidFill>
-                <a:latin typeface="Consolas" panose="020B0609020204030204" pitchFamily="49" charset="0"/>
-              </a:rPr>
-              <a:t>xavier</a:t>
-            </a:r>
-            <a:r>
-              <a:rPr lang="en-US" altLang="ko-KR" dirty="0">
-                <a:solidFill>
-                  <a:srgbClr val="6A9955"/>
-                </a:solidFill>
-                <a:latin typeface="Consolas" panose="020B0609020204030204" pitchFamily="49" charset="0"/>
-              </a:rPr>
-              <a:t> </a:t>
-            </a:r>
-            <a:r>
-              <a:rPr lang="ko-KR" altLang="en-US" dirty="0">
-                <a:solidFill>
-                  <a:srgbClr val="6A9955"/>
-                </a:solidFill>
-                <a:latin typeface="Consolas" panose="020B0609020204030204" pitchFamily="49" charset="0"/>
-              </a:rPr>
-              <a:t>으로 하면 초기의 </a:t>
-            </a:r>
-            <a:r>
-              <a:rPr lang="en-US" altLang="ko-KR" dirty="0">
-                <a:solidFill>
-                  <a:srgbClr val="6A9955"/>
-                </a:solidFill>
-                <a:latin typeface="Consolas" panose="020B0609020204030204" pitchFamily="49" charset="0"/>
-              </a:rPr>
-              <a:t>initializer </a:t>
-            </a:r>
-            <a:r>
-              <a:rPr lang="ko-KR" altLang="en-US" dirty="0">
-                <a:solidFill>
-                  <a:srgbClr val="6A9955"/>
-                </a:solidFill>
-                <a:latin typeface="Consolas" panose="020B0609020204030204" pitchFamily="49" charset="0"/>
-              </a:rPr>
-              <a:t>가 아주 잘 되어 나온다</a:t>
-            </a:r>
-            <a:r>
-              <a:rPr lang="en-US" altLang="ko-KR" dirty="0">
-                <a:solidFill>
-                  <a:srgbClr val="6A9955"/>
-                </a:solidFill>
-                <a:latin typeface="Consolas" panose="020B0609020204030204" pitchFamily="49" charset="0"/>
-              </a:rPr>
-              <a:t>.</a:t>
-            </a:r>
-            <a:endParaRPr lang="ko-KR" altLang="en-US" dirty="0">
-              <a:solidFill>
-                <a:srgbClr val="D4D4D4"/>
-              </a:solidFill>
-              <a:latin typeface="Consolas" panose="020B0609020204030204" pitchFamily="49" charset="0"/>
-            </a:endParaRPr>
-          </a:p>
-          <a:p>
-            <a:r>
-              <a:rPr lang="en-US" altLang="ko-KR" dirty="0">
-                <a:solidFill>
-                  <a:srgbClr val="D4D4D4"/>
-                </a:solidFill>
-                <a:latin typeface="Consolas" panose="020B0609020204030204" pitchFamily="49" charset="0"/>
-              </a:rPr>
-              <a:t>b1 = </a:t>
-            </a:r>
-            <a:r>
-              <a:rPr lang="en-US" altLang="ko-KR" dirty="0" err="1">
-                <a:solidFill>
-                  <a:srgbClr val="D4D4D4"/>
-                </a:solidFill>
-                <a:latin typeface="Consolas" panose="020B0609020204030204" pitchFamily="49" charset="0"/>
-              </a:rPr>
-              <a:t>tf.Variable</a:t>
-            </a:r>
-            <a:r>
-              <a:rPr lang="en-US" altLang="ko-KR" dirty="0">
-                <a:solidFill>
-                  <a:srgbClr val="D4D4D4"/>
-                </a:solidFill>
-                <a:latin typeface="Consolas" panose="020B0609020204030204" pitchFamily="49" charset="0"/>
-              </a:rPr>
-              <a:t>(</a:t>
-            </a:r>
-            <a:r>
-              <a:rPr lang="en-US" altLang="ko-KR" dirty="0" err="1">
-                <a:solidFill>
-                  <a:srgbClr val="D4D4D4"/>
-                </a:solidFill>
-                <a:latin typeface="Consolas" panose="020B0609020204030204" pitchFamily="49" charset="0"/>
-              </a:rPr>
-              <a:t>tf.random_normal</a:t>
-            </a:r>
-            <a:r>
-              <a:rPr lang="en-US" altLang="ko-KR" dirty="0">
-                <a:solidFill>
-                  <a:srgbClr val="D4D4D4"/>
-                </a:solidFill>
-                <a:latin typeface="Consolas" panose="020B0609020204030204" pitchFamily="49" charset="0"/>
-              </a:rPr>
-              <a:t>([</a:t>
-            </a:r>
-            <a:r>
-              <a:rPr lang="en-US" altLang="ko-KR" dirty="0">
-                <a:solidFill>
-                  <a:srgbClr val="B5CEA8"/>
-                </a:solidFill>
-                <a:latin typeface="Consolas" panose="020B0609020204030204" pitchFamily="49" charset="0"/>
-              </a:rPr>
-              <a:t>512</a:t>
-            </a:r>
-            <a:r>
-              <a:rPr lang="en-US" altLang="ko-KR" dirty="0">
-                <a:solidFill>
-                  <a:srgbClr val="D4D4D4"/>
-                </a:solidFill>
-                <a:latin typeface="Consolas" panose="020B0609020204030204" pitchFamily="49" charset="0"/>
-              </a:rPr>
-              <a:t>]))</a:t>
-            </a:r>
-          </a:p>
-          <a:p>
-            <a:r>
-              <a:rPr lang="en-US" altLang="ko-KR" dirty="0">
-                <a:solidFill>
-                  <a:srgbClr val="D4D4D4"/>
-                </a:solidFill>
-                <a:latin typeface="Consolas" panose="020B0609020204030204" pitchFamily="49" charset="0"/>
-              </a:rPr>
-              <a:t>L1 = </a:t>
-            </a:r>
-            <a:r>
-              <a:rPr lang="en-US" altLang="ko-KR" dirty="0" err="1">
-                <a:solidFill>
-                  <a:srgbClr val="D4D4D4"/>
-                </a:solidFill>
-                <a:latin typeface="Consolas" panose="020B0609020204030204" pitchFamily="49" charset="0"/>
-              </a:rPr>
-              <a:t>tf.nn.relu</a:t>
-            </a:r>
-            <a:r>
-              <a:rPr lang="en-US" altLang="ko-KR" dirty="0">
-                <a:solidFill>
-                  <a:srgbClr val="D4D4D4"/>
-                </a:solidFill>
-                <a:latin typeface="Consolas" panose="020B0609020204030204" pitchFamily="49" charset="0"/>
-              </a:rPr>
-              <a:t>(</a:t>
-            </a:r>
-            <a:r>
-              <a:rPr lang="en-US" altLang="ko-KR" dirty="0" err="1">
-                <a:solidFill>
-                  <a:srgbClr val="D4D4D4"/>
-                </a:solidFill>
-                <a:latin typeface="Consolas" panose="020B0609020204030204" pitchFamily="49" charset="0"/>
-              </a:rPr>
-              <a:t>tf.matmul</a:t>
-            </a:r>
-            <a:r>
-              <a:rPr lang="en-US" altLang="ko-KR" dirty="0">
-                <a:solidFill>
-                  <a:srgbClr val="D4D4D4"/>
-                </a:solidFill>
-                <a:latin typeface="Consolas" panose="020B0609020204030204" pitchFamily="49" charset="0"/>
-              </a:rPr>
-              <a:t>(X, W1) + b1</a:t>
-            </a:r>
-            <a:r>
-              <a:rPr lang="en-US" altLang="ko-KR" dirty="0" smtClean="0">
-                <a:solidFill>
-                  <a:srgbClr val="D4D4D4"/>
-                </a:solidFill>
-                <a:latin typeface="Consolas" panose="020B0609020204030204" pitchFamily="49" charset="0"/>
-              </a:rPr>
-              <a:t>)</a:t>
-            </a:r>
-            <a:r>
-              <a:rPr lang="en-US" altLang="ko-KR" dirty="0">
-                <a:solidFill>
-                  <a:srgbClr val="D4D4D4"/>
-                </a:solidFill>
-                <a:latin typeface="Consolas" panose="020B0609020204030204" pitchFamily="49" charset="0"/>
-              </a:rPr>
-              <a:t/>
-            </a:r>
-            <a:br>
-              <a:rPr lang="en-US" altLang="ko-KR" dirty="0">
-                <a:solidFill>
-                  <a:srgbClr val="D4D4D4"/>
-                </a:solidFill>
-                <a:latin typeface="Consolas" panose="020B0609020204030204" pitchFamily="49" charset="0"/>
-              </a:rPr>
-            </a:br>
-            <a:r>
-              <a:rPr lang="en-US" altLang="ko-KR" dirty="0">
-                <a:solidFill>
-                  <a:srgbClr val="D4D4D4"/>
-                </a:solidFill>
-                <a:latin typeface="Consolas" panose="020B0609020204030204" pitchFamily="49" charset="0"/>
-              </a:rPr>
-              <a:t>L1 = </a:t>
-            </a:r>
-            <a:r>
-              <a:rPr lang="en-US" altLang="ko-KR" dirty="0" err="1">
-                <a:solidFill>
-                  <a:srgbClr val="D4D4D4"/>
-                </a:solidFill>
-                <a:latin typeface="Consolas" panose="020B0609020204030204" pitchFamily="49" charset="0"/>
-              </a:rPr>
-              <a:t>tf.nn.dropout</a:t>
-            </a:r>
-            <a:r>
-              <a:rPr lang="en-US" altLang="ko-KR" dirty="0">
-                <a:solidFill>
-                  <a:srgbClr val="D4D4D4"/>
-                </a:solidFill>
-                <a:latin typeface="Consolas" panose="020B0609020204030204" pitchFamily="49" charset="0"/>
-              </a:rPr>
-              <a:t>(L1, </a:t>
-            </a:r>
-            <a:r>
-              <a:rPr lang="en-US" altLang="ko-KR" dirty="0" err="1">
-                <a:solidFill>
-                  <a:srgbClr val="9CDCFE"/>
-                </a:solidFill>
-                <a:latin typeface="Consolas" panose="020B0609020204030204" pitchFamily="49" charset="0"/>
-              </a:rPr>
-              <a:t>keep_prob</a:t>
-            </a:r>
-            <a:r>
-              <a:rPr lang="en-US" altLang="ko-KR" dirty="0">
-                <a:solidFill>
-                  <a:srgbClr val="D4D4D4"/>
-                </a:solidFill>
-                <a:latin typeface="Consolas" panose="020B0609020204030204" pitchFamily="49" charset="0"/>
-              </a:rPr>
-              <a:t>=</a:t>
-            </a:r>
-            <a:r>
-              <a:rPr lang="en-US" altLang="ko-KR" dirty="0" err="1">
-                <a:solidFill>
-                  <a:srgbClr val="D4D4D4"/>
-                </a:solidFill>
-                <a:latin typeface="Consolas" panose="020B0609020204030204" pitchFamily="49" charset="0"/>
-              </a:rPr>
-              <a:t>keep_prob</a:t>
-            </a:r>
-            <a:r>
-              <a:rPr lang="en-US" altLang="ko-KR" dirty="0">
-                <a:solidFill>
-                  <a:srgbClr val="D4D4D4"/>
-                </a:solidFill>
-                <a:latin typeface="Consolas" panose="020B0609020204030204" pitchFamily="49" charset="0"/>
-              </a:rPr>
-              <a:t>)</a:t>
-            </a:r>
-          </a:p>
-          <a:p>
-            <a:r>
-              <a:rPr lang="en-US" altLang="ko-KR" dirty="0">
-                <a:solidFill>
-                  <a:srgbClr val="6A9955"/>
-                </a:solidFill>
-                <a:latin typeface="Consolas" panose="020B0609020204030204" pitchFamily="49" charset="0"/>
-              </a:rPr>
-              <a:t># dropout</a:t>
-            </a:r>
-            <a:r>
-              <a:rPr lang="en-US" altLang="ko-KR" dirty="0" smtClean="0">
-                <a:solidFill>
-                  <a:srgbClr val="D4D4D4"/>
-                </a:solidFill>
-                <a:latin typeface="Consolas" panose="020B0609020204030204" pitchFamily="49" charset="0"/>
-              </a:rPr>
-              <a:t> </a:t>
-            </a:r>
-            <a:r>
-              <a:rPr lang="en-US" altLang="ko-KR" dirty="0" smtClean="0">
-                <a:solidFill>
-                  <a:srgbClr val="6A9955"/>
-                </a:solidFill>
-                <a:latin typeface="Consolas" panose="020B0609020204030204" pitchFamily="49" charset="0"/>
-              </a:rPr>
-              <a:t>layer </a:t>
-            </a:r>
-            <a:r>
-              <a:rPr lang="ko-KR" altLang="en-US" dirty="0">
-                <a:solidFill>
-                  <a:srgbClr val="6A9955"/>
-                </a:solidFill>
-                <a:latin typeface="Consolas" panose="020B0609020204030204" pitchFamily="49" charset="0"/>
-              </a:rPr>
-              <a:t>층이 많아지면서 </a:t>
-            </a:r>
-            <a:r>
-              <a:rPr lang="en-US" altLang="ko-KR" dirty="0" err="1">
-                <a:solidFill>
-                  <a:srgbClr val="6A9955"/>
-                </a:solidFill>
-                <a:latin typeface="Consolas" panose="020B0609020204030204" pitchFamily="49" charset="0"/>
-              </a:rPr>
-              <a:t>overffiting</a:t>
-            </a:r>
-            <a:r>
-              <a:rPr lang="en-US" altLang="ko-KR" dirty="0">
-                <a:solidFill>
-                  <a:srgbClr val="6A9955"/>
-                </a:solidFill>
-                <a:latin typeface="Consolas" panose="020B0609020204030204" pitchFamily="49" charset="0"/>
-              </a:rPr>
-              <a:t> </a:t>
-            </a:r>
-            <a:r>
-              <a:rPr lang="ko-KR" altLang="en-US" dirty="0">
-                <a:solidFill>
-                  <a:srgbClr val="6A9955"/>
-                </a:solidFill>
-                <a:latin typeface="Consolas" panose="020B0609020204030204" pitchFamily="49" charset="0"/>
-              </a:rPr>
-              <a:t>이 일어나는걸 방지한다</a:t>
-            </a:r>
-            <a:r>
-              <a:rPr lang="en-US" altLang="ko-KR" dirty="0">
-                <a:solidFill>
-                  <a:srgbClr val="6A9955"/>
-                </a:solidFill>
-                <a:latin typeface="Consolas" panose="020B0609020204030204" pitchFamily="49" charset="0"/>
-              </a:rPr>
-              <a:t>.</a:t>
-            </a:r>
-            <a:endParaRPr lang="ko-KR" altLang="en-US" dirty="0">
-              <a:solidFill>
-                <a:srgbClr val="D4D4D4"/>
-              </a:solidFill>
-              <a:latin typeface="Consolas" panose="020B0609020204030204" pitchFamily="49" charset="0"/>
-            </a:endParaRPr>
-          </a:p>
-          <a:p>
-            <a:r>
-              <a:rPr lang="en-US" altLang="ko-KR" dirty="0">
-                <a:solidFill>
-                  <a:srgbClr val="6A9955"/>
-                </a:solidFill>
-                <a:latin typeface="Consolas" panose="020B0609020204030204" pitchFamily="49" charset="0"/>
-              </a:rPr>
-              <a:t># </a:t>
-            </a:r>
-            <a:r>
-              <a:rPr lang="ko-KR" altLang="en-US" dirty="0">
-                <a:solidFill>
-                  <a:srgbClr val="6A9955"/>
-                </a:solidFill>
-                <a:latin typeface="Consolas" panose="020B0609020204030204" pitchFamily="49" charset="0"/>
-              </a:rPr>
-              <a:t>전체중의 </a:t>
-            </a:r>
-            <a:r>
-              <a:rPr lang="ko-KR" altLang="en-US" dirty="0" err="1">
-                <a:solidFill>
-                  <a:srgbClr val="6A9955"/>
-                </a:solidFill>
-                <a:latin typeface="Consolas" panose="020B0609020204030204" pitchFamily="49" charset="0"/>
-              </a:rPr>
-              <a:t>몇프로의</a:t>
-            </a:r>
-            <a:r>
-              <a:rPr lang="ko-KR" altLang="en-US" dirty="0">
-                <a:solidFill>
-                  <a:srgbClr val="6A9955"/>
-                </a:solidFill>
-                <a:latin typeface="Consolas" panose="020B0609020204030204" pitchFamily="49" charset="0"/>
-              </a:rPr>
-              <a:t> 네트워크를 끊어줄 것인지 결정한다 통상적으로 </a:t>
-            </a:r>
-            <a:r>
-              <a:rPr lang="en-US" altLang="ko-KR" dirty="0">
-                <a:solidFill>
-                  <a:srgbClr val="6A9955"/>
-                </a:solidFill>
-                <a:latin typeface="Consolas" panose="020B0609020204030204" pitchFamily="49" charset="0"/>
-              </a:rPr>
-              <a:t>0.5~0.7 </a:t>
-            </a:r>
-            <a:r>
-              <a:rPr lang="ko-KR" altLang="en-US" dirty="0">
-                <a:solidFill>
-                  <a:srgbClr val="6A9955"/>
-                </a:solidFill>
-                <a:latin typeface="Consolas" panose="020B0609020204030204" pitchFamily="49" charset="0"/>
-              </a:rPr>
-              <a:t>정도 끊어준다</a:t>
-            </a:r>
-            <a:r>
-              <a:rPr lang="en-US" altLang="ko-KR" dirty="0">
-                <a:solidFill>
-                  <a:srgbClr val="6A9955"/>
-                </a:solidFill>
-                <a:latin typeface="Consolas" panose="020B0609020204030204" pitchFamily="49" charset="0"/>
-              </a:rPr>
-              <a:t>.</a:t>
-            </a:r>
-            <a:endParaRPr lang="ko-KR" altLang="en-US" dirty="0">
-              <a:solidFill>
-                <a:srgbClr val="D4D4D4"/>
-              </a:solidFill>
-              <a:latin typeface="Consolas" panose="020B0609020204030204" pitchFamily="49" charset="0"/>
-            </a:endParaRPr>
-          </a:p>
-          <a:p>
-            <a:r>
-              <a:rPr lang="en-US" altLang="ko-KR" dirty="0">
-                <a:solidFill>
-                  <a:srgbClr val="6A9955"/>
-                </a:solidFill>
-                <a:latin typeface="Consolas" panose="020B0609020204030204" pitchFamily="49" charset="0"/>
-              </a:rPr>
-              <a:t># </a:t>
-            </a:r>
-            <a:r>
-              <a:rPr lang="ko-KR" altLang="en-US" dirty="0" err="1">
-                <a:solidFill>
-                  <a:srgbClr val="6A9955"/>
-                </a:solidFill>
-                <a:latin typeface="Consolas" panose="020B0609020204030204" pitchFamily="49" charset="0"/>
-              </a:rPr>
-              <a:t>테스팅</a:t>
-            </a:r>
-            <a:r>
-              <a:rPr lang="ko-KR" altLang="en-US" dirty="0">
-                <a:solidFill>
-                  <a:srgbClr val="6A9955"/>
-                </a:solidFill>
-                <a:latin typeface="Consolas" panose="020B0609020204030204" pitchFamily="49" charset="0"/>
-              </a:rPr>
-              <a:t> </a:t>
-            </a:r>
-            <a:r>
-              <a:rPr lang="ko-KR" altLang="en-US" dirty="0" err="1">
-                <a:solidFill>
-                  <a:srgbClr val="6A9955"/>
-                </a:solidFill>
-                <a:latin typeface="Consolas" panose="020B0609020204030204" pitchFamily="49" charset="0"/>
-              </a:rPr>
-              <a:t>할때는</a:t>
-            </a:r>
-            <a:r>
-              <a:rPr lang="ko-KR" altLang="en-US" dirty="0">
-                <a:solidFill>
-                  <a:srgbClr val="6A9955"/>
-                </a:solidFill>
-                <a:latin typeface="Consolas" panose="020B0609020204030204" pitchFamily="49" charset="0"/>
-              </a:rPr>
-              <a:t> 네트워크를 총 </a:t>
-            </a:r>
-            <a:r>
-              <a:rPr lang="ko-KR" altLang="en-US" dirty="0" err="1">
-                <a:solidFill>
-                  <a:srgbClr val="6A9955"/>
-                </a:solidFill>
-                <a:latin typeface="Consolas" panose="020B0609020204030204" pitchFamily="49" charset="0"/>
-              </a:rPr>
-              <a:t>동원해야하기</a:t>
-            </a:r>
-            <a:r>
-              <a:rPr lang="ko-KR" altLang="en-US" dirty="0">
-                <a:solidFill>
-                  <a:srgbClr val="6A9955"/>
-                </a:solidFill>
-                <a:latin typeface="Consolas" panose="020B0609020204030204" pitchFamily="49" charset="0"/>
-              </a:rPr>
-              <a:t> 때문에 </a:t>
-            </a:r>
-            <a:r>
-              <a:rPr lang="en-US" altLang="ko-KR" dirty="0">
-                <a:solidFill>
-                  <a:srgbClr val="6A9955"/>
-                </a:solidFill>
-                <a:latin typeface="Consolas" panose="020B0609020204030204" pitchFamily="49" charset="0"/>
-              </a:rPr>
-              <a:t>1</a:t>
-            </a:r>
-            <a:r>
-              <a:rPr lang="ko-KR" altLang="en-US" dirty="0">
-                <a:solidFill>
-                  <a:srgbClr val="6A9955"/>
-                </a:solidFill>
-                <a:latin typeface="Consolas" panose="020B0609020204030204" pitchFamily="49" charset="0"/>
-              </a:rPr>
-              <a:t>으로 설정한다</a:t>
-            </a:r>
-            <a:endParaRPr lang="ko-KR" altLang="en-US" dirty="0">
-              <a:solidFill>
-                <a:srgbClr val="D4D4D4"/>
-              </a:solidFill>
-              <a:latin typeface="Consolas" panose="020B0609020204030204" pitchFamily="49" charset="0"/>
-            </a:endParaRPr>
-          </a:p>
-          <a:p>
-            <a:endParaRPr lang="en-US" altLang="ko-KR" b="0" dirty="0" smtClean="0">
-              <a:solidFill>
-                <a:srgbClr val="D4D4D4"/>
-              </a:solidFill>
-              <a:effectLst/>
-              <a:latin typeface="Consolas" panose="020B0609020204030204" pitchFamily="49" charset="0"/>
-            </a:endParaRPr>
-          </a:p>
-          <a:p>
-            <a:endParaRPr lang="en-US" altLang="ko-KR" dirty="0">
-              <a:solidFill>
-                <a:srgbClr val="D4D4D4"/>
-              </a:solidFill>
-              <a:latin typeface="Consolas" panose="020B0609020204030204" pitchFamily="49" charset="0"/>
-            </a:endParaRPr>
-          </a:p>
-          <a:p>
-            <a:endParaRPr lang="en-US" altLang="ko-KR" b="0" dirty="0">
-              <a:solidFill>
-                <a:srgbClr val="D4D4D4"/>
-              </a:solidFill>
-              <a:effectLst/>
-              <a:latin typeface="Consolas" panose="020B0609020204030204" pitchFamily="49" charset="0"/>
-            </a:endParaRPr>
+              <a:t>89%</a:t>
+            </a:r>
           </a:p>
         </p:txBody>
       </p:sp>
     </p:spTree>
     <p:extLst>
       <p:ext uri="{BB962C8B-B14F-4D97-AF65-F5344CB8AC3E}">
-        <p14:creationId xmlns:p14="http://schemas.microsoft.com/office/powerpoint/2010/main" val="1910385608"/>
+        <p14:creationId xmlns:p14="http://schemas.microsoft.com/office/powerpoint/2010/main" val="494445868"/>
       </p:ext>
     </p:extLst>
   </p:cSld>
@@ -17364,463 +15661,84 @@
           <a:lstStyle/>
           <a:p>
             <a:r>
-              <a:rPr lang="en-US" altLang="zh-CN" dirty="0"/>
-              <a:t>Code </a:t>
+              <a:rPr lang="ko-KR" altLang="en-US" dirty="0" err="1" smtClean="0"/>
+              <a:t>학습률</a:t>
             </a:r>
             <a:r>
               <a:rPr lang="ko-KR" altLang="en-US" dirty="0" smtClean="0"/>
-              <a:t>설명 </a:t>
-            </a:r>
-            <a:r>
-              <a:rPr lang="en-US" altLang="ko-KR" dirty="0" smtClean="0"/>
-              <a:t>( </a:t>
-            </a:r>
-            <a:r>
-              <a:rPr lang="ko-KR" altLang="en-US" dirty="0" smtClean="0"/>
-              <a:t>마지막 </a:t>
-            </a:r>
-            <a:r>
-              <a:rPr lang="en-US" altLang="ko-KR" dirty="0" smtClean="0"/>
-              <a:t>layer </a:t>
-            </a:r>
-            <a:r>
-              <a:rPr lang="ko-KR" altLang="en-US" dirty="0" smtClean="0"/>
-              <a:t>값 </a:t>
-            </a:r>
-            <a:r>
-              <a:rPr lang="en-US" altLang="ko-KR" dirty="0" smtClean="0"/>
-              <a:t>)</a:t>
+              <a:t> 조정</a:t>
             </a:r>
             <a:endParaRPr lang="zh-CN" altLang="en-US" dirty="0"/>
           </a:p>
         </p:txBody>
       </p:sp>
+      <p:pic>
+        <p:nvPicPr>
+          <p:cNvPr id="3" name="그림 2"/>
+          <p:cNvPicPr>
+            <a:picLocks noChangeAspect="1"/>
+          </p:cNvPicPr>
+          <p:nvPr/>
+        </p:nvPicPr>
+        <p:blipFill>
+          <a:blip r:embed="rId3">
+            <a:extLst>
+              <a:ext uri="{28A0092B-C50C-407E-A947-70E740481C1C}">
+                <a14:useLocalDpi xmlns:a14="http://schemas.microsoft.com/office/drawing/2010/main" val="0"/>
+              </a:ext>
+            </a:extLst>
+          </a:blip>
+          <a:stretch>
+            <a:fillRect/>
+          </a:stretch>
+        </p:blipFill>
+        <p:spPr>
+          <a:xfrm>
+            <a:off x="1621946" y="1527203"/>
+            <a:ext cx="7858125" cy="4757738"/>
+          </a:xfrm>
+          <a:prstGeom prst="rect">
+            <a:avLst/>
+          </a:prstGeom>
+        </p:spPr>
+      </p:pic>
       <p:sp>
         <p:nvSpPr>
-          <p:cNvPr id="8" name="직사각형 7"/>
-          <p:cNvSpPr/>
+          <p:cNvPr id="7" name="TextBox 6"/>
+          <p:cNvSpPr txBox="1"/>
           <p:nvPr/>
         </p:nvSpPr>
         <p:spPr>
           <a:xfrm>
-            <a:off x="854015" y="1863306"/>
-            <a:ext cx="9989389" cy="3139321"/>
+            <a:off x="8833740" y="2018582"/>
+            <a:ext cx="646331" cy="369332"/>
           </a:xfrm>
           <a:prstGeom prst="rect">
             <a:avLst/>
           </a:prstGeom>
-          <a:solidFill>
-            <a:schemeClr val="tx1">
-              <a:lumMod val="85000"/>
-              <a:lumOff val="15000"/>
-            </a:schemeClr>
-          </a:solidFill>
+          <a:noFill/>
         </p:spPr>
         <p:txBody>
-          <a:bodyPr wrap="square">
+          <a:bodyPr wrap="none" rtlCol="0">
             <a:spAutoFit/>
           </a:bodyPr>
           <a:lstStyle/>
           <a:p>
-            <a:endParaRPr lang="en-US" altLang="ko-KR" dirty="0" smtClean="0">
-              <a:solidFill>
-                <a:srgbClr val="D4D4D4"/>
-              </a:solidFill>
-              <a:latin typeface="Consolas" panose="020B0609020204030204" pitchFamily="49" charset="0"/>
-            </a:endParaRPr>
-          </a:p>
-          <a:p>
-            <a:endParaRPr lang="en-US" altLang="ko-KR" dirty="0">
-              <a:solidFill>
-                <a:srgbClr val="D4D4D4"/>
-              </a:solidFill>
-              <a:latin typeface="Consolas" panose="020B0609020204030204" pitchFamily="49" charset="0"/>
-            </a:endParaRPr>
-          </a:p>
-          <a:p>
-            <a:endParaRPr lang="en-US" altLang="ko-KR" dirty="0" smtClean="0">
-              <a:solidFill>
-                <a:srgbClr val="D4D4D4"/>
-              </a:solidFill>
-              <a:latin typeface="Consolas" panose="020B0609020204030204" pitchFamily="49" charset="0"/>
-            </a:endParaRPr>
-          </a:p>
-          <a:p>
             <a:r>
               <a:rPr lang="en-US" altLang="ko-KR" dirty="0" smtClean="0">
                 <a:solidFill>
-                  <a:srgbClr val="D4D4D4"/>
+                  <a:srgbClr val="FF0000"/>
                 </a:solidFill>
-                <a:latin typeface="Consolas" panose="020B0609020204030204" pitchFamily="49" charset="0"/>
               </a:rPr>
-              <a:t>W5 </a:t>
-            </a:r>
-            <a:r>
-              <a:rPr lang="en-US" altLang="ko-KR" dirty="0">
-                <a:solidFill>
-                  <a:srgbClr val="D4D4D4"/>
-                </a:solidFill>
-                <a:latin typeface="Consolas" panose="020B0609020204030204" pitchFamily="49" charset="0"/>
-              </a:rPr>
-              <a:t>= </a:t>
-            </a:r>
-            <a:r>
-              <a:rPr lang="en-US" altLang="ko-KR" dirty="0" err="1">
-                <a:solidFill>
-                  <a:srgbClr val="D4D4D4"/>
-                </a:solidFill>
-                <a:latin typeface="Consolas" panose="020B0609020204030204" pitchFamily="49" charset="0"/>
-              </a:rPr>
-              <a:t>tf.get_variable</a:t>
-            </a:r>
-            <a:r>
-              <a:rPr lang="en-US" altLang="ko-KR" dirty="0">
-                <a:solidFill>
-                  <a:srgbClr val="D4D4D4"/>
-                </a:solidFill>
-                <a:latin typeface="Consolas" panose="020B0609020204030204" pitchFamily="49" charset="0"/>
-              </a:rPr>
-              <a:t>(</a:t>
-            </a:r>
-            <a:r>
-              <a:rPr lang="en-US" altLang="ko-KR" dirty="0">
-                <a:solidFill>
-                  <a:srgbClr val="CE9178"/>
-                </a:solidFill>
-                <a:latin typeface="Consolas" panose="020B0609020204030204" pitchFamily="49" charset="0"/>
-              </a:rPr>
-              <a:t>"W5"</a:t>
-            </a:r>
-            <a:r>
-              <a:rPr lang="en-US" altLang="ko-KR" dirty="0">
-                <a:solidFill>
-                  <a:srgbClr val="D4D4D4"/>
-                </a:solidFill>
-                <a:latin typeface="Consolas" panose="020B0609020204030204" pitchFamily="49" charset="0"/>
-              </a:rPr>
-              <a:t>, </a:t>
-            </a:r>
-            <a:r>
-              <a:rPr lang="en-US" altLang="ko-KR" dirty="0">
-                <a:solidFill>
-                  <a:srgbClr val="9CDCFE"/>
-                </a:solidFill>
-                <a:latin typeface="Consolas" panose="020B0609020204030204" pitchFamily="49" charset="0"/>
-              </a:rPr>
-              <a:t>shape</a:t>
-            </a:r>
-            <a:r>
-              <a:rPr lang="en-US" altLang="ko-KR" dirty="0">
-                <a:solidFill>
-                  <a:srgbClr val="D4D4D4"/>
-                </a:solidFill>
-                <a:latin typeface="Consolas" panose="020B0609020204030204" pitchFamily="49" charset="0"/>
-              </a:rPr>
-              <a:t>=[</a:t>
-            </a:r>
-            <a:r>
-              <a:rPr lang="en-US" altLang="ko-KR" dirty="0">
-                <a:solidFill>
-                  <a:srgbClr val="B5CEA8"/>
-                </a:solidFill>
-                <a:latin typeface="Consolas" panose="020B0609020204030204" pitchFamily="49" charset="0"/>
-              </a:rPr>
-              <a:t>512</a:t>
-            </a:r>
-            <a:r>
-              <a:rPr lang="en-US" altLang="ko-KR" dirty="0">
-                <a:solidFill>
-                  <a:srgbClr val="D4D4D4"/>
-                </a:solidFill>
-                <a:latin typeface="Consolas" panose="020B0609020204030204" pitchFamily="49" charset="0"/>
-              </a:rPr>
-              <a:t>, </a:t>
-            </a:r>
-            <a:r>
-              <a:rPr lang="en-US" altLang="ko-KR" dirty="0">
-                <a:solidFill>
-                  <a:srgbClr val="B5CEA8"/>
-                </a:solidFill>
-                <a:latin typeface="Consolas" panose="020B0609020204030204" pitchFamily="49" charset="0"/>
-              </a:rPr>
-              <a:t>10</a:t>
-            </a:r>
-            <a:r>
-              <a:rPr lang="en-US" altLang="ko-KR" dirty="0">
-                <a:solidFill>
-                  <a:srgbClr val="D4D4D4"/>
-                </a:solidFill>
-                <a:latin typeface="Consolas" panose="020B0609020204030204" pitchFamily="49" charset="0"/>
-              </a:rPr>
-              <a:t>], </a:t>
-            </a:r>
-            <a:r>
-              <a:rPr lang="en-US" altLang="ko-KR" dirty="0" smtClean="0">
-                <a:solidFill>
-                  <a:srgbClr val="9CDCFE"/>
-                </a:solidFill>
-                <a:latin typeface="Consolas" panose="020B0609020204030204" pitchFamily="49" charset="0"/>
-              </a:rPr>
-              <a:t>initializer</a:t>
-            </a:r>
-            <a:r>
-              <a:rPr lang="en-US" altLang="ko-KR" dirty="0" smtClean="0">
-                <a:solidFill>
-                  <a:srgbClr val="D4D4D4"/>
-                </a:solidFill>
-                <a:latin typeface="Consolas" panose="020B0609020204030204" pitchFamily="49" charset="0"/>
-              </a:rPr>
-              <a:t>=</a:t>
-            </a:r>
-            <a:r>
-              <a:rPr lang="en-US" altLang="ko-KR" dirty="0" err="1" smtClean="0">
-                <a:solidFill>
-                  <a:srgbClr val="D4D4D4"/>
-                </a:solidFill>
-                <a:latin typeface="Consolas" panose="020B0609020204030204" pitchFamily="49" charset="0"/>
-              </a:rPr>
-              <a:t>tf.contrib.layers.xavier_initializer</a:t>
-            </a:r>
-            <a:r>
-              <a:rPr lang="en-US" altLang="ko-KR" dirty="0" smtClean="0">
-                <a:solidFill>
-                  <a:srgbClr val="D4D4D4"/>
-                </a:solidFill>
-                <a:latin typeface="Consolas" panose="020B0609020204030204" pitchFamily="49" charset="0"/>
-              </a:rPr>
-              <a:t>())</a:t>
-            </a:r>
-          </a:p>
-          <a:p>
-            <a:r>
-              <a:rPr lang="en-US" altLang="ko-KR" dirty="0">
-                <a:solidFill>
-                  <a:srgbClr val="6A9955"/>
-                </a:solidFill>
-                <a:latin typeface="Consolas" panose="020B0609020204030204" pitchFamily="49" charset="0"/>
-              </a:rPr>
-              <a:t># 512</a:t>
-            </a:r>
-            <a:r>
-              <a:rPr lang="ko-KR" altLang="en-US" dirty="0">
-                <a:solidFill>
-                  <a:srgbClr val="6A9955"/>
-                </a:solidFill>
-                <a:latin typeface="Consolas" panose="020B0609020204030204" pitchFamily="49" charset="0"/>
-              </a:rPr>
-              <a:t>개 인풋이 들어가고 </a:t>
-            </a:r>
-            <a:r>
-              <a:rPr lang="en-US" altLang="ko-KR" dirty="0">
-                <a:solidFill>
-                  <a:srgbClr val="6A9955"/>
-                </a:solidFill>
-                <a:latin typeface="Consolas" panose="020B0609020204030204" pitchFamily="49" charset="0"/>
-              </a:rPr>
-              <a:t>10</a:t>
-            </a:r>
-            <a:r>
-              <a:rPr lang="ko-KR" altLang="en-US" dirty="0">
-                <a:solidFill>
-                  <a:srgbClr val="6A9955"/>
-                </a:solidFill>
-                <a:latin typeface="Consolas" panose="020B0609020204030204" pitchFamily="49" charset="0"/>
-              </a:rPr>
-              <a:t>개의 </a:t>
-            </a:r>
-            <a:r>
-              <a:rPr lang="ko-KR" altLang="en-US" dirty="0" smtClean="0">
-                <a:solidFill>
-                  <a:srgbClr val="6A9955"/>
-                </a:solidFill>
-                <a:latin typeface="Consolas" panose="020B0609020204030204" pitchFamily="49" charset="0"/>
-              </a:rPr>
-              <a:t>아웃풋</a:t>
-            </a:r>
-            <a:endParaRPr lang="en-US" altLang="ko-KR" dirty="0">
-              <a:solidFill>
-                <a:srgbClr val="D4D4D4"/>
-              </a:solidFill>
-              <a:latin typeface="Consolas" panose="020B0609020204030204" pitchFamily="49" charset="0"/>
-            </a:endParaRPr>
-          </a:p>
-          <a:p>
-            <a:r>
-              <a:rPr lang="en-US" altLang="ko-KR" dirty="0">
-                <a:solidFill>
-                  <a:srgbClr val="6A9955"/>
-                </a:solidFill>
-                <a:latin typeface="Consolas" panose="020B0609020204030204" pitchFamily="49" charset="0"/>
-              </a:rPr>
-              <a:t># </a:t>
-            </a:r>
-            <a:r>
-              <a:rPr lang="ko-KR" altLang="en-US" dirty="0">
-                <a:solidFill>
-                  <a:srgbClr val="6A9955"/>
-                </a:solidFill>
-                <a:latin typeface="Consolas" panose="020B0609020204030204" pitchFamily="49" charset="0"/>
-              </a:rPr>
-              <a:t>마지막 </a:t>
-            </a:r>
-            <a:r>
-              <a:rPr lang="ko-KR" altLang="en-US" dirty="0" err="1">
-                <a:solidFill>
-                  <a:srgbClr val="6A9955"/>
-                </a:solidFill>
-                <a:latin typeface="Consolas" panose="020B0609020204030204" pitchFamily="49" charset="0"/>
-              </a:rPr>
-              <a:t>레이어는</a:t>
-            </a:r>
-            <a:r>
-              <a:rPr lang="ko-KR" altLang="en-US" dirty="0">
-                <a:solidFill>
-                  <a:srgbClr val="6A9955"/>
-                </a:solidFill>
-                <a:latin typeface="Consolas" panose="020B0609020204030204" pitchFamily="49" charset="0"/>
-              </a:rPr>
-              <a:t> </a:t>
-            </a:r>
-            <a:r>
-              <a:rPr lang="en-US" altLang="ko-KR" dirty="0">
-                <a:solidFill>
-                  <a:srgbClr val="6A9955"/>
-                </a:solidFill>
-                <a:latin typeface="Consolas" panose="020B0609020204030204" pitchFamily="49" charset="0"/>
-              </a:rPr>
-              <a:t>10</a:t>
-            </a:r>
-            <a:r>
-              <a:rPr lang="ko-KR" altLang="en-US" dirty="0">
-                <a:solidFill>
-                  <a:srgbClr val="6A9955"/>
-                </a:solidFill>
-                <a:latin typeface="Consolas" panose="020B0609020204030204" pitchFamily="49" charset="0"/>
-              </a:rPr>
-              <a:t>개가 </a:t>
-            </a:r>
-            <a:r>
-              <a:rPr lang="ko-KR" altLang="en-US" dirty="0" err="1">
-                <a:solidFill>
-                  <a:srgbClr val="6A9955"/>
-                </a:solidFill>
-                <a:latin typeface="Consolas" panose="020B0609020204030204" pitchFamily="49" charset="0"/>
-              </a:rPr>
-              <a:t>나와야하는건</a:t>
-            </a:r>
-            <a:r>
-              <a:rPr lang="ko-KR" altLang="en-US" dirty="0">
-                <a:solidFill>
-                  <a:srgbClr val="6A9955"/>
-                </a:solidFill>
-                <a:latin typeface="Consolas" panose="020B0609020204030204" pitchFamily="49" charset="0"/>
-              </a:rPr>
-              <a:t> 고정</a:t>
-            </a:r>
-            <a:endParaRPr lang="ko-KR" altLang="en-US" dirty="0">
-              <a:solidFill>
-                <a:srgbClr val="D4D4D4"/>
-              </a:solidFill>
-              <a:latin typeface="Consolas" panose="020B0609020204030204" pitchFamily="49" charset="0"/>
-            </a:endParaRPr>
-          </a:p>
-          <a:p>
-            <a:r>
-              <a:rPr lang="en-US" altLang="ko-KR" dirty="0">
-                <a:solidFill>
-                  <a:srgbClr val="D4D4D4"/>
-                </a:solidFill>
-                <a:latin typeface="Consolas" panose="020B0609020204030204" pitchFamily="49" charset="0"/>
-              </a:rPr>
-              <a:t>b5 = </a:t>
-            </a:r>
-            <a:r>
-              <a:rPr lang="en-US" altLang="ko-KR" dirty="0" err="1">
-                <a:solidFill>
-                  <a:srgbClr val="D4D4D4"/>
-                </a:solidFill>
-                <a:latin typeface="Consolas" panose="020B0609020204030204" pitchFamily="49" charset="0"/>
-              </a:rPr>
-              <a:t>tf.Variable</a:t>
-            </a:r>
-            <a:r>
-              <a:rPr lang="en-US" altLang="ko-KR" dirty="0">
-                <a:solidFill>
-                  <a:srgbClr val="D4D4D4"/>
-                </a:solidFill>
-                <a:latin typeface="Consolas" panose="020B0609020204030204" pitchFamily="49" charset="0"/>
-              </a:rPr>
-              <a:t>(</a:t>
-            </a:r>
-            <a:r>
-              <a:rPr lang="en-US" altLang="ko-KR" dirty="0" err="1">
-                <a:solidFill>
-                  <a:srgbClr val="D4D4D4"/>
-                </a:solidFill>
-                <a:latin typeface="Consolas" panose="020B0609020204030204" pitchFamily="49" charset="0"/>
-              </a:rPr>
-              <a:t>tf.random_normal</a:t>
-            </a:r>
-            <a:r>
-              <a:rPr lang="en-US" altLang="ko-KR" dirty="0">
-                <a:solidFill>
-                  <a:srgbClr val="D4D4D4"/>
-                </a:solidFill>
-                <a:latin typeface="Consolas" panose="020B0609020204030204" pitchFamily="49" charset="0"/>
-              </a:rPr>
-              <a:t>([</a:t>
-            </a:r>
-            <a:r>
-              <a:rPr lang="en-US" altLang="ko-KR" dirty="0">
-                <a:solidFill>
-                  <a:srgbClr val="B5CEA8"/>
-                </a:solidFill>
-                <a:latin typeface="Consolas" panose="020B0609020204030204" pitchFamily="49" charset="0"/>
-              </a:rPr>
-              <a:t>10</a:t>
-            </a:r>
-            <a:r>
-              <a:rPr lang="en-US" altLang="ko-KR" dirty="0" smtClean="0">
-                <a:solidFill>
-                  <a:srgbClr val="D4D4D4"/>
-                </a:solidFill>
-                <a:latin typeface="Consolas" panose="020B0609020204030204" pitchFamily="49" charset="0"/>
-              </a:rPr>
-              <a:t>]))</a:t>
-            </a:r>
-          </a:p>
-          <a:p>
-            <a:endParaRPr lang="en-US" altLang="ko-KR" b="0" dirty="0">
-              <a:solidFill>
-                <a:srgbClr val="D4D4D4"/>
-              </a:solidFill>
-              <a:effectLst/>
-              <a:latin typeface="Consolas" panose="020B0609020204030204" pitchFamily="49" charset="0"/>
-            </a:endParaRPr>
-          </a:p>
-          <a:p>
-            <a:endParaRPr lang="en-US" altLang="ko-KR" dirty="0" smtClean="0">
-              <a:solidFill>
-                <a:srgbClr val="D4D4D4"/>
-              </a:solidFill>
-              <a:latin typeface="Consolas" panose="020B0609020204030204" pitchFamily="49" charset="0"/>
-            </a:endParaRPr>
-          </a:p>
-          <a:p>
-            <a:endParaRPr lang="en-US" altLang="ko-KR" b="0" dirty="0">
-              <a:solidFill>
-                <a:srgbClr val="D4D4D4"/>
-              </a:solidFill>
-              <a:effectLst/>
-              <a:latin typeface="Consolas" panose="020B0609020204030204" pitchFamily="49" charset="0"/>
-            </a:endParaRPr>
+              <a:t>93%</a:t>
+            </a:r>
           </a:p>
         </p:txBody>
       </p:sp>
     </p:spTree>
     <p:extLst>
       <p:ext uri="{BB962C8B-B14F-4D97-AF65-F5344CB8AC3E}">
-        <p14:creationId xmlns:p14="http://schemas.microsoft.com/office/powerpoint/2010/main" val="4113136324"/>
+        <p14:creationId xmlns:p14="http://schemas.microsoft.com/office/powerpoint/2010/main" val="891125073"/>
       </p:ext>
     </p:extLst>
   </p:cSld>
@@ -17882,24 +15800,24 @@
           <a:lstStyle/>
           <a:p>
             <a:r>
-              <a:rPr lang="en-US" altLang="zh-CN" dirty="0"/>
-              <a:t>Code </a:t>
+              <a:rPr lang="ko-KR" altLang="en-US" dirty="0" err="1" smtClean="0"/>
+              <a:t>입력노드개수</a:t>
+            </a:r>
+            <a:r>
+              <a:rPr lang="en-US" altLang="ko-KR" dirty="0" smtClean="0"/>
+              <a:t>, </a:t>
+            </a:r>
+            <a:r>
+              <a:rPr lang="ko-KR" altLang="en-US" dirty="0" err="1" smtClean="0"/>
+              <a:t>학습률</a:t>
             </a:r>
             <a:r>
               <a:rPr lang="ko-KR" altLang="en-US" dirty="0" smtClean="0"/>
-              <a:t>설명 </a:t>
-            </a:r>
-            <a:r>
-              <a:rPr lang="en-US" altLang="ko-KR" smtClean="0"/>
-              <a:t>( layer </a:t>
-            </a:r>
-            <a:r>
-              <a:rPr lang="ko-KR" altLang="en-US" dirty="0" smtClean="0"/>
-              <a:t> </a:t>
+              <a:t> 조정</a:t>
             </a:r>
             <a:r>
               <a:rPr lang="en-US" altLang="ko-KR" dirty="0" smtClean="0"/>
-              <a:t>)</a:t>
+              <a:t>, Dropout</a:t>
             </a:r>
             <a:endParaRPr lang="zh-CN" altLang="en-US" dirty="0"/>
           </a:p>
@@ -17907,7 +15825,7 @@
       </p:sp>
       <p:pic>
         <p:nvPicPr>
-          <p:cNvPr id="3" name="그림 2"/>
+          <p:cNvPr id="4" name="그림 3"/>
           <p:cNvPicPr>
             <a:picLocks noChangeAspect="1"/>
           </p:cNvPicPr>
@@ -17927,18 +15845,51 @@
         </p:blipFill>
         <p:spPr>
           <a:xfrm>
-            <a:off x="1933575" y="1285875"/>
-            <a:ext cx="8324850" cy="4286250"/>
+            <a:off x="1621946" y="1527203"/>
+            <a:ext cx="7858125" cy="4757738"/>
           </a:xfrm>
           <a:prstGeom prst="rect">
             <a:avLst/>
           </a:prstGeom>
         </p:spPr>
       </p:pic>
+      <p:sp>
+        <p:nvSpPr>
+          <p:cNvPr id="6" name="TextBox 5"/>
+          <p:cNvSpPr txBox="1"/>
+          <p:nvPr/>
+        </p:nvSpPr>
+        <p:spPr>
+          <a:xfrm>
+            <a:off x="8833740" y="2139351"/>
+            <a:ext cx="646331" cy="369332"/>
+          </a:xfrm>
+          <a:prstGeom prst="rect">
+            <a:avLst/>
+          </a:prstGeom>
+          <a:noFill/>
+        </p:spPr>
+        <p:txBody>
+          <a:bodyPr wrap="none" rtlCol="0">
+            <a:spAutoFit/>
+          </a:bodyPr>
+          <a:lstStyle/>
+          <a:p>
+            <a:r>
+              <a:rPr lang="en-US" altLang="ko-KR" dirty="0" smtClean="0">
+                <a:solidFill>
+                  <a:srgbClr val="FF0000"/>
+                </a:solidFill>
+              </a:rPr>
+              <a:t>96%</a:t>
+            </a:r>
+          </a:p>
+        </p:txBody>
+      </p:sp>
     </p:spTree>
     <p:extLst>
       <p:ext uri="{BB962C8B-B14F-4D97-AF65-F5344CB8AC3E}">
-        <p14:creationId xmlns:p14="http://schemas.microsoft.com/office/powerpoint/2010/main" val="3670696020"/>
+        <p14:creationId xmlns:p14="http://schemas.microsoft.com/office/powerpoint/2010/main" val="242926968"/>
       </p:ext>
     </p:extLst>
   </p:cSld>

</xml_diff>

<commit_message>
edit : ppt update
피피티 내용 변경
</commit_message>
<xml_diff>
--- a/ppt/인공지능 MNIST 발표(정건우).pptx
+++ b/ppt/인공지능 MNIST 발표(정건우).pptx
@@ -212,7 +212,7 @@
           <a:p>
             <a:fld id="{4C93EB0C-C87C-475F-B8F8-469DF3A467E8}" type="datetimeFigureOut">
               <a:rPr lang="zh-CN" altLang="en-US" smtClean="0"/>
-              <a:t>2018/12/20</a:t>
+              <a:t>2018/12/21</a:t>
             </a:fld>
             <a:endParaRPr lang="zh-CN" altLang="en-US"/>
           </a:p>
@@ -1463,7 +1463,7 @@
           <a:p>
             <a:fld id="{D997B5FA-0921-464F-AAE1-844C04324D75}" type="datetimeFigureOut">
               <a:rPr lang="zh-CN" altLang="en-US" smtClean="0"/>
-              <a:t>2018/12/20</a:t>
+              <a:t>2018/12/21</a:t>
             </a:fld>
             <a:endParaRPr lang="zh-CN" altLang="en-US"/>
           </a:p>
@@ -1626,7 +1626,7 @@
           <a:p>
             <a:fld id="{D997B5FA-0921-464F-AAE1-844C04324D75}" type="datetimeFigureOut">
               <a:rPr lang="zh-CN" altLang="en-US" smtClean="0"/>
-              <a:t>2018/12/20</a:t>
+              <a:t>2018/12/21</a:t>
             </a:fld>
             <a:endParaRPr lang="zh-CN" altLang="en-US"/>
           </a:p>
@@ -1799,7 +1799,7 @@
           <a:p>
             <a:fld id="{D997B5FA-0921-464F-AAE1-844C04324D75}" type="datetimeFigureOut">
               <a:rPr lang="zh-CN" altLang="en-US" smtClean="0"/>
-              <a:t>2018/12/20</a:t>
+              <a:t>2018/12/21</a:t>
             </a:fld>
             <a:endParaRPr lang="zh-CN" altLang="en-US"/>
           </a:p>
@@ -1962,7 +1962,7 @@
           <a:p>
             <a:fld id="{D997B5FA-0921-464F-AAE1-844C04324D75}" type="datetimeFigureOut">
               <a:rPr lang="zh-CN" altLang="en-US" smtClean="0"/>
-              <a:t>2018/12/20</a:t>
+              <a:t>2018/12/21</a:t>
             </a:fld>
             <a:endParaRPr lang="zh-CN" altLang="en-US"/>
           </a:p>
@@ -2202,7 +2202,7 @@
           <a:p>
             <a:fld id="{D997B5FA-0921-464F-AAE1-844C04324D75}" type="datetimeFigureOut">
               <a:rPr lang="zh-CN" altLang="en-US" smtClean="0"/>
-              <a:t>2018/12/20</a:t>
+              <a:t>2018/12/21</a:t>
             </a:fld>
             <a:endParaRPr lang="zh-CN" altLang="en-US"/>
           </a:p>
@@ -2426,7 +2426,7 @@
           <a:p>
             <a:fld id="{D997B5FA-0921-464F-AAE1-844C04324D75}" type="datetimeFigureOut">
               <a:rPr lang="zh-CN" altLang="en-US" smtClean="0"/>
-              <a:t>2018/12/20</a:t>
+              <a:t>2018/12/21</a:t>
             </a:fld>
             <a:endParaRPr lang="zh-CN" altLang="en-US"/>
           </a:p>
@@ -2785,7 +2785,7 @@
           <a:p>
             <a:fld id="{D997B5FA-0921-464F-AAE1-844C04324D75}" type="datetimeFigureOut">
               <a:rPr lang="zh-CN" altLang="en-US" smtClean="0"/>
-              <a:t>2018/12/20</a:t>
+              <a:t>2018/12/21</a:t>
             </a:fld>
             <a:endParaRPr lang="zh-CN" altLang="en-US"/>
           </a:p>
@@ -3031,7 +3031,7 @@
           <a:p>
             <a:fld id="{D997B5FA-0921-464F-AAE1-844C04324D75}" type="datetimeFigureOut">
               <a:rPr lang="zh-CN" altLang="en-US" smtClean="0"/>
-              <a:t>2018/12/20</a:t>
+              <a:t>2018/12/21</a:t>
             </a:fld>
             <a:endParaRPr lang="zh-CN" altLang="en-US"/>
           </a:p>
@@ -3301,7 +3301,7 @@
           <a:p>
             <a:fld id="{D997B5FA-0921-464F-AAE1-844C04324D75}" type="datetimeFigureOut">
               <a:rPr lang="zh-CN" altLang="en-US" smtClean="0"/>
-              <a:t>2018/12/20</a:t>
+              <a:t>2018/12/21</a:t>
             </a:fld>
             <a:endParaRPr lang="zh-CN" altLang="en-US"/>
           </a:p>
@@ -3548,7 +3548,7 @@
           <a:p>
             <a:fld id="{D997B5FA-0921-464F-AAE1-844C04324D75}" type="datetimeFigureOut">
               <a:rPr lang="zh-CN" altLang="en-US" smtClean="0"/>
-              <a:t>2018/12/20</a:t>
+              <a:t>2018/12/21</a:t>
             </a:fld>
             <a:endParaRPr lang="zh-CN" altLang="en-US"/>
           </a:p>
@@ -3763,7 +3763,7 @@
           <a:p>
             <a:fld id="{D997B5FA-0921-464F-AAE1-844C04324D75}" type="datetimeFigureOut">
               <a:rPr lang="zh-CN" altLang="en-US" smtClean="0"/>
-              <a:t>2018/12/20</a:t>
+              <a:t>2018/12/21</a:t>
             </a:fld>
             <a:endParaRPr lang="zh-CN" altLang="en-US"/>
           </a:p>
@@ -9617,23 +9617,7 @@
                   <a:schemeClr val="bg1"/>
                 </a:solidFill>
               </a:rPr>
-              <a:t>의 트레이닝 </a:t>
-            </a:r>
-            <a:r>
-              <a:rPr lang="ko-KR" altLang="en-US" sz="4000" dirty="0" smtClean="0">
-                <a:solidFill>
-                  <a:schemeClr val="bg1"/>
-                </a:solidFill>
-              </a:rPr>
-              <a:t>정확도 </a:t>
-            </a:r>
-            <a:r>
-              <a:rPr lang="ko-KR" altLang="en-US" sz="4000" dirty="0" smtClean="0">
-                <a:solidFill>
-                  <a:schemeClr val="bg1"/>
-                </a:solidFill>
-              </a:rPr>
-              <a:t>향상 시키는 방법</a:t>
+              <a:t>의 트레이닝 정확도 향상 시키는 방법</a:t>
             </a:r>
             <a:endParaRPr lang="zh-CN" altLang="en-US" sz="4000" dirty="0">
               <a:solidFill>
@@ -11542,19 +11526,7 @@
                 </a:solidFill>
                 <a:ea typeface="黑体" panose="02010609060101010101" pitchFamily="49" charset="-122"/>
               </a:rPr>
-              <a:t>73</a:t>
-            </a:r>
-            <a:r>
-              <a:rPr lang="en-US" altLang="zh-CN" sz="1400" dirty="0" smtClean="0">
-                <a:solidFill>
-                  <a:schemeClr val="tx1">
-                    <a:lumMod val="50000"/>
-                    <a:lumOff val="50000"/>
-                  </a:schemeClr>
-                </a:solidFill>
-                <a:ea typeface="黑体" panose="02010609060101010101" pitchFamily="49" charset="-122"/>
-              </a:rPr>
-              <a:t>% </a:t>
+              <a:t>73% </a:t>
             </a:r>
             <a:r>
               <a:rPr lang="ko-KR" altLang="en-US" sz="1400" dirty="0" err="1" smtClean="0">
@@ -11590,7 +11562,7 @@
                 </a:solidFill>
                 <a:ea typeface="黑体" panose="02010609060101010101" pitchFamily="49" charset="-122"/>
               </a:rPr>
-              <a:t>한계층에</a:t>
+              <a:t>한층에</a:t>
             </a:r>
             <a:r>
               <a:rPr lang="ko-KR" altLang="en-US" sz="1400" dirty="0" smtClean="0">
@@ -11790,19 +11762,7 @@
                 </a:solidFill>
                 <a:ea typeface="黑体" panose="02010609060101010101" pitchFamily="49" charset="-122"/>
               </a:rPr>
-              <a:t>89</a:t>
-            </a:r>
-            <a:r>
-              <a:rPr lang="en-US" altLang="zh-CN" sz="1400" dirty="0" smtClean="0">
-                <a:solidFill>
-                  <a:schemeClr val="tx1">
-                    <a:lumMod val="50000"/>
-                    <a:lumOff val="50000"/>
-                  </a:schemeClr>
-                </a:solidFill>
-                <a:ea typeface="黑体" panose="02010609060101010101" pitchFamily="49" charset="-122"/>
-              </a:rPr>
-              <a:t>% </a:t>
+              <a:t>89% </a:t>
             </a:r>
             <a:r>
               <a:rPr lang="en-US" altLang="zh-CN" sz="1400" dirty="0" err="1" smtClean="0">
@@ -12468,31 +12428,8 @@
                 <a:latin typeface="微软雅黑" panose="020B0503020204020204" pitchFamily="34" charset="-122"/>
                 <a:ea typeface="微软雅黑" panose="020B0503020204020204" pitchFamily="34" charset="-122"/>
               </a:rPr>
-              <a:t>. ( 73% =&gt; 89% )</a:t>
-            </a:r>
-            <a:r>
-              <a:rPr lang="en-US" altLang="ko-KR" sz="1600" dirty="0" smtClean="0">
-                <a:solidFill>
-                  <a:schemeClr val="tx1">
-                    <a:lumMod val="50000"/>
-                    <a:lumOff val="50000"/>
-                  </a:schemeClr>
-                </a:solidFill>
-                <a:latin typeface="微软雅黑" panose="020B0503020204020204" pitchFamily="34" charset="-122"/>
-                <a:ea typeface="微软雅黑" panose="020B0503020204020204" pitchFamily="34" charset="-122"/>
-              </a:rPr>
-              <a:t> </a:t>
-            </a:r>
-            <a:endParaRPr lang="en-US" altLang="ko-KR" sz="1600" dirty="0" smtClean="0">
-              <a:solidFill>
-                <a:schemeClr val="tx1">
-                  <a:lumMod val="50000"/>
-                  <a:lumOff val="50000"/>
-                </a:schemeClr>
-              </a:solidFill>
-              <a:latin typeface="微软雅黑" panose="020B0503020204020204" pitchFamily="34" charset="-122"/>
-              <a:ea typeface="微软雅黑" panose="020B0503020204020204" pitchFamily="34" charset="-122"/>
-            </a:endParaRPr>
+              <a:t>. ( 73% =&gt; 89% ) </a:t>
+            </a:r>
           </a:p>
           <a:p>
             <a:pPr>
@@ -15371,16 +15308,8 @@
           <a:lstStyle/>
           <a:p>
             <a:r>
-              <a:rPr lang="en-US" altLang="zh-CN" dirty="0" smtClean="0"/>
-              <a:t>Layer 1 </a:t>
-            </a:r>
-            <a:r>
-              <a:rPr lang="ko-KR" altLang="en-US" dirty="0" smtClean="0"/>
-              <a:t>계층</a:t>
-            </a:r>
-            <a:r>
-              <a:rPr lang="en-US" altLang="ko-KR" dirty="0" smtClean="0"/>
-              <a:t>, Sigmoid </a:t>
+              <a:rPr lang="en-US" altLang="ko-KR" smtClean="0"/>
+              <a:t>Sigmoid </a:t>
             </a:r>
             <a:r>
               <a:rPr lang="ko-KR" altLang="en-US" dirty="0" smtClean="0"/>

</xml_diff>